<commit_message>
Map-aiheen päivitys keväälle 2021
</commit_message>
<xml_diff>
--- a/docs/02_map/map.pptx
+++ b/docs/02_map/map.pptx
@@ -160,6 +160,35 @@
 </p:presentation>
 </file>
 
+<file path=ppt/changesInfos/changesInfo1.xml><?xml version="1.0" encoding="utf-8"?>
+<pc:chgInfo xmlns:a="http://schemas.openxmlformats.org/drawingml/2006/main" xmlns:r="http://schemas.openxmlformats.org/officeDocument/2006/relationships" xmlns:ac="http://schemas.microsoft.com/office/drawing/2013/main/command" xmlns:pc="http://schemas.microsoft.com/office/powerpoint/2013/main/command">
+  <pc:docChgLst>
+    <pc:chgData name="Havulinna Teemu" userId="a878cb1a-b84b-4af8-b70d-118ae37251be" providerId="ADAL" clId="{0E5A9482-3633-4356-A10C-EE67413DAB71}"/>
+    <pc:docChg chg="modSld">
+      <pc:chgData name="Havulinna Teemu" userId="a878cb1a-b84b-4af8-b70d-118ae37251be" providerId="ADAL" clId="{0E5A9482-3633-4356-A10C-EE67413DAB71}" dt="2021-03-23T11:32:48.312" v="0" actId="6549"/>
+      <pc:docMkLst>
+        <pc:docMk/>
+      </pc:docMkLst>
+      <pc:sldChg chg="modSp">
+        <pc:chgData name="Havulinna Teemu" userId="a878cb1a-b84b-4af8-b70d-118ae37251be" providerId="ADAL" clId="{0E5A9482-3633-4356-A10C-EE67413DAB71}" dt="2021-03-23T11:32:48.312" v="0" actId="6549"/>
+        <pc:sldMkLst>
+          <pc:docMk/>
+          <pc:sldMk cId="1282232282" sldId="317"/>
+        </pc:sldMkLst>
+        <pc:spChg chg="mod">
+          <ac:chgData name="Havulinna Teemu" userId="a878cb1a-b84b-4af8-b70d-118ae37251be" providerId="ADAL" clId="{0E5A9482-3633-4356-A10C-EE67413DAB71}" dt="2021-03-23T11:32:48.312" v="0" actId="6549"/>
+          <ac:spMkLst>
+            <pc:docMk/>
+            <pc:sldMk cId="1282232282" sldId="317"/>
+            <ac:spMk id="2" creationId="{00000000-0000-0000-0000-000000000000}"/>
+          </ac:spMkLst>
+        </pc:spChg>
+      </pc:sldChg>
+    </pc:docChg>
+  </pc:docChgLst>
+</pc:chgInfo>
+</file>
+
 <file path=ppt/notesMasters/notesMaster1.xml><?xml version="1.0" encoding="utf-8"?>
 <p:notesMaster xmlns:a="http://schemas.openxmlformats.org/drawingml/2006/main" xmlns:r="http://schemas.openxmlformats.org/officeDocument/2006/relationships" xmlns:p="http://schemas.openxmlformats.org/presentationml/2006/main">
   <p:cSld>
@@ -242,7 +271,7 @@
           <a:p>
             <a:fld id="{37F8FCC0-28AE-4846-8967-7283F75549EB}" type="datetimeFigureOut">
               <a:rPr lang="fi-FI" smtClean="0"/>
-              <a:t>19.10.2020</a:t>
+              <a:t>23.3.2021</a:t>
             </a:fld>
             <a:endParaRPr lang="fi-FI"/>
           </a:p>
@@ -306,35 +335,35 @@
           <a:p>
             <a:pPr lvl="0"/>
             <a:r>
-              <a:rPr lang="en-US" smtClean="0"/>
+              <a:rPr lang="en-US"/>
               <a:t>Edit Master text styles</a:t>
             </a:r>
           </a:p>
           <a:p>
             <a:pPr lvl="1"/>
             <a:r>
-              <a:rPr lang="en-US" smtClean="0"/>
+              <a:rPr lang="en-US"/>
               <a:t>Second level</a:t>
             </a:r>
           </a:p>
           <a:p>
             <a:pPr lvl="2"/>
             <a:r>
-              <a:rPr lang="en-US" smtClean="0"/>
+              <a:rPr lang="en-US"/>
               <a:t>Third level</a:t>
             </a:r>
           </a:p>
           <a:p>
             <a:pPr lvl="3"/>
             <a:r>
-              <a:rPr lang="en-US" smtClean="0"/>
+              <a:rPr lang="en-US"/>
               <a:t>Fourth level</a:t>
             </a:r>
           </a:p>
           <a:p>
             <a:pPr lvl="4"/>
             <a:r>
-              <a:rPr lang="en-US" smtClean="0"/>
+              <a:rPr lang="en-US"/>
               <a:t>Fifth level</a:t>
             </a:r>
             <a:endParaRPr lang="fi-FI"/>
@@ -555,10 +584,9 @@
           <a:lstStyle/>
           <a:p>
             <a:r>
-              <a:rPr lang="fi-FI" dirty="0" smtClean="0"/>
+              <a:rPr lang="fi-FI" dirty="0"/>
               <a:t>Tietorakenne on tietojenkäsittelyssä esiintyvä termi, joka tarkoittaa tapaa tallentaa tietokoneen käsittelemää dataa siten, että datan käyttö olisi mahdollisimman tehokasta. --https://fi.wikipedia.org/wiki/Tietorakenne</a:t>
             </a:r>
-            <a:endParaRPr lang="fi-FI" dirty="0"/>
           </a:p>
         </p:txBody>
       </p:sp>
@@ -636,7 +664,7 @@
           <a:lstStyle/>
           <a:p>
             <a:r>
-              <a:rPr lang="en-US" smtClean="0"/>
+              <a:rPr lang="en-US"/>
               <a:t>Click to edit Master title style</a:t>
             </a:r>
             <a:endParaRPr lang="fi-FI"/>
@@ -701,7 +729,7 @@
           </a:lstStyle>
           <a:p>
             <a:r>
-              <a:rPr lang="en-US" smtClean="0"/>
+              <a:rPr lang="en-US"/>
               <a:t>Click to edit Master subtitle style</a:t>
             </a:r>
             <a:endParaRPr lang="fi-FI"/>
@@ -731,7 +759,7 @@
           <a:p>
             <a:fld id="{3E6BC776-2618-4139-89AA-C416010F3F00}" type="datetimeFigureOut">
               <a:rPr lang="fi-FI" smtClean="0"/>
-              <a:t>19.10.2020</a:t>
+              <a:t>23.3.2021</a:t>
             </a:fld>
             <a:endParaRPr lang="fi-FI"/>
           </a:p>
@@ -807,13 +835,6 @@
   <p:clrMapOvr>
     <a:masterClrMapping/>
   </p:clrMapOvr>
-  <p:timing>
-    <p:tnLst>
-      <p:par>
-        <p:cTn id="1" dur="indefinite" restart="never" nodeType="tmRoot"/>
-      </p:par>
-    </p:tnLst>
-  </p:timing>
 </p:sldLayout>
 </file>
 
@@ -850,7 +871,7 @@
           <a:lstStyle/>
           <a:p>
             <a:r>
-              <a:rPr lang="en-US" smtClean="0"/>
+              <a:rPr lang="en-US"/>
               <a:t>Click to edit Master title style</a:t>
             </a:r>
             <a:endParaRPr lang="fi-FI"/>
@@ -874,35 +895,35 @@
           <a:p>
             <a:pPr lvl="0"/>
             <a:r>
-              <a:rPr lang="en-US" smtClean="0"/>
+              <a:rPr lang="en-US"/>
               <a:t>Edit Master text styles</a:t>
             </a:r>
           </a:p>
           <a:p>
             <a:pPr lvl="1"/>
             <a:r>
-              <a:rPr lang="en-US" smtClean="0"/>
+              <a:rPr lang="en-US"/>
               <a:t>Second level</a:t>
             </a:r>
           </a:p>
           <a:p>
             <a:pPr lvl="2"/>
             <a:r>
-              <a:rPr lang="en-US" smtClean="0"/>
+              <a:rPr lang="en-US"/>
               <a:t>Third level</a:t>
             </a:r>
           </a:p>
           <a:p>
             <a:pPr lvl="3"/>
             <a:r>
-              <a:rPr lang="en-US" smtClean="0"/>
+              <a:rPr lang="en-US"/>
               <a:t>Fourth level</a:t>
             </a:r>
           </a:p>
           <a:p>
             <a:pPr lvl="4"/>
             <a:r>
-              <a:rPr lang="en-US" smtClean="0"/>
+              <a:rPr lang="en-US"/>
               <a:t>Fifth level</a:t>
             </a:r>
             <a:endParaRPr lang="fi-FI"/>
@@ -932,7 +953,7 @@
           <a:p>
             <a:fld id="{3E6BC776-2618-4139-89AA-C416010F3F00}" type="datetimeFigureOut">
               <a:rPr lang="fi-FI" smtClean="0"/>
-              <a:t>19.10.2020</a:t>
+              <a:t>23.3.2021</a:t>
             </a:fld>
             <a:endParaRPr lang="fi-FI"/>
           </a:p>
@@ -1043,7 +1064,7 @@
           <a:lstStyle/>
           <a:p>
             <a:r>
-              <a:rPr lang="en-US" smtClean="0"/>
+              <a:rPr lang="en-US"/>
               <a:t>Click to edit Master title style</a:t>
             </a:r>
             <a:endParaRPr lang="fi-FI"/>
@@ -1072,35 +1093,35 @@
           <a:p>
             <a:pPr lvl="0"/>
             <a:r>
-              <a:rPr lang="en-US" smtClean="0"/>
+              <a:rPr lang="en-US"/>
               <a:t>Edit Master text styles</a:t>
             </a:r>
           </a:p>
           <a:p>
             <a:pPr lvl="1"/>
             <a:r>
-              <a:rPr lang="en-US" smtClean="0"/>
+              <a:rPr lang="en-US"/>
               <a:t>Second level</a:t>
             </a:r>
           </a:p>
           <a:p>
             <a:pPr lvl="2"/>
             <a:r>
-              <a:rPr lang="en-US" smtClean="0"/>
+              <a:rPr lang="en-US"/>
               <a:t>Third level</a:t>
             </a:r>
           </a:p>
           <a:p>
             <a:pPr lvl="3"/>
             <a:r>
-              <a:rPr lang="en-US" smtClean="0"/>
+              <a:rPr lang="en-US"/>
               <a:t>Fourth level</a:t>
             </a:r>
           </a:p>
           <a:p>
             <a:pPr lvl="4"/>
             <a:r>
-              <a:rPr lang="en-US" smtClean="0"/>
+              <a:rPr lang="en-US"/>
               <a:t>Fifth level</a:t>
             </a:r>
             <a:endParaRPr lang="fi-FI"/>
@@ -1130,7 +1151,7 @@
           <a:p>
             <a:fld id="{3E6BC776-2618-4139-89AA-C416010F3F00}" type="datetimeFigureOut">
               <a:rPr lang="fi-FI" smtClean="0"/>
-              <a:t>19.10.2020</a:t>
+              <a:t>23.3.2021</a:t>
             </a:fld>
             <a:endParaRPr lang="fi-FI"/>
           </a:p>
@@ -1241,7 +1262,7 @@
           <a:lstStyle/>
           <a:p>
             <a:r>
-              <a:rPr lang="en-US" smtClean="0"/>
+              <a:rPr lang="en-US"/>
               <a:t>Click to edit Master title style</a:t>
             </a:r>
             <a:endParaRPr lang="fi-FI"/>
@@ -1270,35 +1291,35 @@
           <a:p>
             <a:pPr lvl="0"/>
             <a:r>
-              <a:rPr lang="en-US" smtClean="0"/>
+              <a:rPr lang="en-US"/>
               <a:t>Edit Master text styles</a:t>
             </a:r>
           </a:p>
           <a:p>
             <a:pPr lvl="1"/>
             <a:r>
-              <a:rPr lang="en-US" smtClean="0"/>
+              <a:rPr lang="en-US"/>
               <a:t>Second level</a:t>
             </a:r>
           </a:p>
           <a:p>
             <a:pPr lvl="2"/>
             <a:r>
-              <a:rPr lang="en-US" smtClean="0"/>
+              <a:rPr lang="en-US"/>
               <a:t>Third level</a:t>
             </a:r>
           </a:p>
           <a:p>
             <a:pPr lvl="3"/>
             <a:r>
-              <a:rPr lang="en-US" smtClean="0"/>
+              <a:rPr lang="en-US"/>
               <a:t>Fourth level</a:t>
             </a:r>
           </a:p>
           <a:p>
             <a:pPr lvl="4"/>
             <a:r>
-              <a:rPr lang="en-US" smtClean="0"/>
+              <a:rPr lang="en-US"/>
               <a:t>Fifth level</a:t>
             </a:r>
             <a:endParaRPr lang="fi-FI"/>
@@ -1327,35 +1348,35 @@
           <a:p>
             <a:pPr lvl="0"/>
             <a:r>
-              <a:rPr lang="en-US" smtClean="0"/>
+              <a:rPr lang="en-US"/>
               <a:t>Edit Master text styles</a:t>
             </a:r>
           </a:p>
           <a:p>
             <a:pPr lvl="1"/>
             <a:r>
-              <a:rPr lang="en-US" smtClean="0"/>
+              <a:rPr lang="en-US"/>
               <a:t>Second level</a:t>
             </a:r>
           </a:p>
           <a:p>
             <a:pPr lvl="2"/>
             <a:r>
-              <a:rPr lang="en-US" smtClean="0"/>
+              <a:rPr lang="en-US"/>
               <a:t>Third level</a:t>
             </a:r>
           </a:p>
           <a:p>
             <a:pPr lvl="3"/>
             <a:r>
-              <a:rPr lang="en-US" smtClean="0"/>
+              <a:rPr lang="en-US"/>
               <a:t>Fourth level</a:t>
             </a:r>
           </a:p>
           <a:p>
             <a:pPr lvl="4"/>
             <a:r>
-              <a:rPr lang="en-US" smtClean="0"/>
+              <a:rPr lang="en-US"/>
               <a:t>Fifth level</a:t>
             </a:r>
             <a:endParaRPr lang="fi-FI"/>
@@ -1385,7 +1406,7 @@
           <a:p>
             <a:fld id="{3E6BC776-2618-4139-89AA-C416010F3F00}" type="datetimeFigureOut">
               <a:rPr lang="fi-FI" smtClean="0"/>
-              <a:t>19.10.2020</a:t>
+              <a:t>23.3.2021</a:t>
             </a:fld>
             <a:endParaRPr lang="fi-FI"/>
           </a:p>
@@ -1455,13 +1476,6 @@
   <p:clrMapOvr>
     <a:masterClrMapping/>
   </p:clrMapOvr>
-  <p:timing>
-    <p:tnLst>
-      <p:par>
-        <p:cTn id="1" dur="indefinite" restart="never" nodeType="tmRoot"/>
-      </p:par>
-    </p:tnLst>
-  </p:timing>
 </p:sldLayout>
 </file>
 
@@ -1498,7 +1512,7 @@
           <a:lstStyle/>
           <a:p>
             <a:r>
-              <a:rPr lang="en-US" smtClean="0"/>
+              <a:rPr lang="en-US"/>
               <a:t>Click to edit Master title style</a:t>
             </a:r>
             <a:endParaRPr lang="fi-FI"/>
@@ -1522,35 +1536,35 @@
           <a:p>
             <a:pPr lvl="0"/>
             <a:r>
-              <a:rPr lang="en-US" smtClean="0"/>
+              <a:rPr lang="en-US"/>
               <a:t>Edit Master text styles</a:t>
             </a:r>
           </a:p>
           <a:p>
             <a:pPr lvl="1"/>
             <a:r>
-              <a:rPr lang="en-US" smtClean="0"/>
+              <a:rPr lang="en-US"/>
               <a:t>Second level</a:t>
             </a:r>
           </a:p>
           <a:p>
             <a:pPr lvl="2"/>
             <a:r>
-              <a:rPr lang="en-US" smtClean="0"/>
+              <a:rPr lang="en-US"/>
               <a:t>Third level</a:t>
             </a:r>
           </a:p>
           <a:p>
             <a:pPr lvl="3"/>
             <a:r>
-              <a:rPr lang="en-US" smtClean="0"/>
+              <a:rPr lang="en-US"/>
               <a:t>Fourth level</a:t>
             </a:r>
           </a:p>
           <a:p>
             <a:pPr lvl="4"/>
             <a:r>
-              <a:rPr lang="en-US" smtClean="0"/>
+              <a:rPr lang="en-US"/>
               <a:t>Fifth level</a:t>
             </a:r>
             <a:endParaRPr lang="fi-FI"/>
@@ -1580,7 +1594,7 @@
           <a:p>
             <a:fld id="{3E6BC776-2618-4139-89AA-C416010F3F00}" type="datetimeFigureOut">
               <a:rPr lang="fi-FI" smtClean="0"/>
-              <a:t>19.10.2020</a:t>
+              <a:t>23.3.2021</a:t>
             </a:fld>
             <a:endParaRPr lang="fi-FI"/>
           </a:p>
@@ -1656,13 +1670,6 @@
   <p:clrMapOvr>
     <a:masterClrMapping/>
   </p:clrMapOvr>
-  <p:timing>
-    <p:tnLst>
-      <p:par>
-        <p:cTn id="1" dur="indefinite" restart="never" nodeType="tmRoot"/>
-      </p:par>
-    </p:tnLst>
-  </p:timing>
 </p:sldLayout>
 </file>
 
@@ -1708,7 +1715,7 @@
           </a:lstStyle>
           <a:p>
             <a:r>
-              <a:rPr lang="en-US" smtClean="0"/>
+              <a:rPr lang="en-US"/>
               <a:t>Click to edit Master title style</a:t>
             </a:r>
             <a:endParaRPr lang="fi-FI"/>
@@ -1774,7 +1781,7 @@
           <a:p>
             <a:pPr lvl="0"/>
             <a:r>
-              <a:rPr lang="en-US" smtClean="0"/>
+              <a:rPr lang="en-US"/>
               <a:t>Edit Master text styles</a:t>
             </a:r>
           </a:p>
@@ -1803,7 +1810,7 @@
           <a:p>
             <a:fld id="{3E6BC776-2618-4139-89AA-C416010F3F00}" type="datetimeFigureOut">
               <a:rPr lang="fi-FI" smtClean="0"/>
-              <a:t>19.10.2020</a:t>
+              <a:t>23.3.2021</a:t>
             </a:fld>
             <a:endParaRPr lang="fi-FI"/>
           </a:p>
@@ -1873,13 +1880,6 @@
   <p:clrMapOvr>
     <a:masterClrMapping/>
   </p:clrMapOvr>
-  <p:timing>
-    <p:tnLst>
-      <p:par>
-        <p:cTn id="1" dur="indefinite" restart="never" nodeType="tmRoot"/>
-      </p:par>
-    </p:tnLst>
-  </p:timing>
 </p:sldLayout>
 </file>
 
@@ -1916,7 +1916,7 @@
           <a:lstStyle/>
           <a:p>
             <a:r>
-              <a:rPr lang="en-US" smtClean="0"/>
+              <a:rPr lang="en-US"/>
               <a:t>Click to edit Master title style</a:t>
             </a:r>
             <a:endParaRPr lang="fi-FI"/>
@@ -1973,35 +1973,35 @@
           <a:p>
             <a:pPr lvl="0"/>
             <a:r>
-              <a:rPr lang="en-US" smtClean="0"/>
+              <a:rPr lang="en-US"/>
               <a:t>Edit Master text styles</a:t>
             </a:r>
           </a:p>
           <a:p>
             <a:pPr lvl="1"/>
             <a:r>
-              <a:rPr lang="en-US" smtClean="0"/>
+              <a:rPr lang="en-US"/>
               <a:t>Second level</a:t>
             </a:r>
           </a:p>
           <a:p>
             <a:pPr lvl="2"/>
             <a:r>
-              <a:rPr lang="en-US" smtClean="0"/>
+              <a:rPr lang="en-US"/>
               <a:t>Third level</a:t>
             </a:r>
           </a:p>
           <a:p>
             <a:pPr lvl="3"/>
             <a:r>
-              <a:rPr lang="en-US" smtClean="0"/>
+              <a:rPr lang="en-US"/>
               <a:t>Fourth level</a:t>
             </a:r>
           </a:p>
           <a:p>
             <a:pPr lvl="4"/>
             <a:r>
-              <a:rPr lang="en-US" smtClean="0"/>
+              <a:rPr lang="en-US"/>
               <a:t>Fifth level</a:t>
             </a:r>
             <a:endParaRPr lang="fi-FI"/>
@@ -2058,35 +2058,35 @@
           <a:p>
             <a:pPr lvl="0"/>
             <a:r>
-              <a:rPr lang="en-US" smtClean="0"/>
+              <a:rPr lang="en-US"/>
               <a:t>Edit Master text styles</a:t>
             </a:r>
           </a:p>
           <a:p>
             <a:pPr lvl="1"/>
             <a:r>
-              <a:rPr lang="en-US" smtClean="0"/>
+              <a:rPr lang="en-US"/>
               <a:t>Second level</a:t>
             </a:r>
           </a:p>
           <a:p>
             <a:pPr lvl="2"/>
             <a:r>
-              <a:rPr lang="en-US" smtClean="0"/>
+              <a:rPr lang="en-US"/>
               <a:t>Third level</a:t>
             </a:r>
           </a:p>
           <a:p>
             <a:pPr lvl="3"/>
             <a:r>
-              <a:rPr lang="en-US" smtClean="0"/>
+              <a:rPr lang="en-US"/>
               <a:t>Fourth level</a:t>
             </a:r>
           </a:p>
           <a:p>
             <a:pPr lvl="4"/>
             <a:r>
-              <a:rPr lang="en-US" smtClean="0"/>
+              <a:rPr lang="en-US"/>
               <a:t>Fifth level</a:t>
             </a:r>
             <a:endParaRPr lang="fi-FI"/>
@@ -2116,7 +2116,7 @@
           <a:p>
             <a:fld id="{3E6BC776-2618-4139-89AA-C416010F3F00}" type="datetimeFigureOut">
               <a:rPr lang="fi-FI" smtClean="0"/>
-              <a:t>19.10.2020</a:t>
+              <a:t>23.3.2021</a:t>
             </a:fld>
             <a:endParaRPr lang="fi-FI"/>
           </a:p>
@@ -2231,7 +2231,7 @@
           </a:lstStyle>
           <a:p>
             <a:r>
-              <a:rPr lang="en-US" smtClean="0"/>
+              <a:rPr lang="en-US"/>
               <a:t>Click to edit Master title style</a:t>
             </a:r>
             <a:endParaRPr lang="fi-FI"/>
@@ -2297,7 +2297,7 @@
           <a:p>
             <a:pPr lvl="0"/>
             <a:r>
-              <a:rPr lang="en-US" smtClean="0"/>
+              <a:rPr lang="en-US"/>
               <a:t>Edit Master text styles</a:t>
             </a:r>
           </a:p>
@@ -2353,35 +2353,35 @@
           <a:p>
             <a:pPr lvl="0"/>
             <a:r>
-              <a:rPr lang="en-US" smtClean="0"/>
+              <a:rPr lang="en-US"/>
               <a:t>Edit Master text styles</a:t>
             </a:r>
           </a:p>
           <a:p>
             <a:pPr lvl="1"/>
             <a:r>
-              <a:rPr lang="en-US" smtClean="0"/>
+              <a:rPr lang="en-US"/>
               <a:t>Second level</a:t>
             </a:r>
           </a:p>
           <a:p>
             <a:pPr lvl="2"/>
             <a:r>
-              <a:rPr lang="en-US" smtClean="0"/>
+              <a:rPr lang="en-US"/>
               <a:t>Third level</a:t>
             </a:r>
           </a:p>
           <a:p>
             <a:pPr lvl="3"/>
             <a:r>
-              <a:rPr lang="en-US" smtClean="0"/>
+              <a:rPr lang="en-US"/>
               <a:t>Fourth level</a:t>
             </a:r>
           </a:p>
           <a:p>
             <a:pPr lvl="4"/>
             <a:r>
-              <a:rPr lang="en-US" smtClean="0"/>
+              <a:rPr lang="en-US"/>
               <a:t>Fifth level</a:t>
             </a:r>
             <a:endParaRPr lang="fi-FI"/>
@@ -2447,7 +2447,7 @@
           <a:p>
             <a:pPr lvl="0"/>
             <a:r>
-              <a:rPr lang="en-US" smtClean="0"/>
+              <a:rPr lang="en-US"/>
               <a:t>Edit Master text styles</a:t>
             </a:r>
           </a:p>
@@ -2503,35 +2503,35 @@
           <a:p>
             <a:pPr lvl="0"/>
             <a:r>
-              <a:rPr lang="en-US" smtClean="0"/>
+              <a:rPr lang="en-US"/>
               <a:t>Edit Master text styles</a:t>
             </a:r>
           </a:p>
           <a:p>
             <a:pPr lvl="1"/>
             <a:r>
-              <a:rPr lang="en-US" smtClean="0"/>
+              <a:rPr lang="en-US"/>
               <a:t>Second level</a:t>
             </a:r>
           </a:p>
           <a:p>
             <a:pPr lvl="2"/>
             <a:r>
-              <a:rPr lang="en-US" smtClean="0"/>
+              <a:rPr lang="en-US"/>
               <a:t>Third level</a:t>
             </a:r>
           </a:p>
           <a:p>
             <a:pPr lvl="3"/>
             <a:r>
-              <a:rPr lang="en-US" smtClean="0"/>
+              <a:rPr lang="en-US"/>
               <a:t>Fourth level</a:t>
             </a:r>
           </a:p>
           <a:p>
             <a:pPr lvl="4"/>
             <a:r>
-              <a:rPr lang="en-US" smtClean="0"/>
+              <a:rPr lang="en-US"/>
               <a:t>Fifth level</a:t>
             </a:r>
             <a:endParaRPr lang="fi-FI"/>
@@ -2561,7 +2561,7 @@
           <a:p>
             <a:fld id="{3E6BC776-2618-4139-89AA-C416010F3F00}" type="datetimeFigureOut">
               <a:rPr lang="fi-FI" smtClean="0"/>
-              <a:t>19.10.2020</a:t>
+              <a:t>23.3.2021</a:t>
             </a:fld>
             <a:endParaRPr lang="fi-FI"/>
           </a:p>
@@ -2667,7 +2667,7 @@
           <a:lstStyle/>
           <a:p>
             <a:r>
-              <a:rPr lang="en-US" smtClean="0"/>
+              <a:rPr lang="en-US"/>
               <a:t>Click to edit Master title style</a:t>
             </a:r>
             <a:endParaRPr lang="fi-FI"/>
@@ -2697,7 +2697,7 @@
           <a:p>
             <a:fld id="{3E6BC776-2618-4139-89AA-C416010F3F00}" type="datetimeFigureOut">
               <a:rPr lang="fi-FI" smtClean="0"/>
-              <a:t>19.10.2020</a:t>
+              <a:t>23.3.2021</a:t>
             </a:fld>
             <a:endParaRPr lang="fi-FI"/>
           </a:p>
@@ -2810,7 +2810,7 @@
           <a:p>
             <a:fld id="{3E6BC776-2618-4139-89AA-C416010F3F00}" type="datetimeFigureOut">
               <a:rPr lang="fi-FI" smtClean="0"/>
-              <a:t>19.10.2020</a:t>
+              <a:t>23.3.2021</a:t>
             </a:fld>
             <a:endParaRPr lang="fi-FI"/>
           </a:p>
@@ -2925,7 +2925,7 @@
           </a:lstStyle>
           <a:p>
             <a:r>
-              <a:rPr lang="en-US" smtClean="0"/>
+              <a:rPr lang="en-US"/>
               <a:t>Click to edit Master title style</a:t>
             </a:r>
             <a:endParaRPr lang="fi-FI"/>
@@ -2982,35 +2982,35 @@
           <a:p>
             <a:pPr lvl="0"/>
             <a:r>
-              <a:rPr lang="en-US" smtClean="0"/>
+              <a:rPr lang="en-US"/>
               <a:t>Edit Master text styles</a:t>
             </a:r>
           </a:p>
           <a:p>
             <a:pPr lvl="1"/>
             <a:r>
-              <a:rPr lang="en-US" smtClean="0"/>
+              <a:rPr lang="en-US"/>
               <a:t>Second level</a:t>
             </a:r>
           </a:p>
           <a:p>
             <a:pPr lvl="2"/>
             <a:r>
-              <a:rPr lang="en-US" smtClean="0"/>
+              <a:rPr lang="en-US"/>
               <a:t>Third level</a:t>
             </a:r>
           </a:p>
           <a:p>
             <a:pPr lvl="3"/>
             <a:r>
-              <a:rPr lang="en-US" smtClean="0"/>
+              <a:rPr lang="en-US"/>
               <a:t>Fourth level</a:t>
             </a:r>
           </a:p>
           <a:p>
             <a:pPr lvl="4"/>
             <a:r>
-              <a:rPr lang="en-US" smtClean="0"/>
+              <a:rPr lang="en-US"/>
               <a:t>Fifth level</a:t>
             </a:r>
             <a:endParaRPr lang="fi-FI"/>
@@ -3076,7 +3076,7 @@
           <a:p>
             <a:pPr lvl="0"/>
             <a:r>
-              <a:rPr lang="en-US" smtClean="0"/>
+              <a:rPr lang="en-US"/>
               <a:t>Edit Master text styles</a:t>
             </a:r>
           </a:p>
@@ -3105,7 +3105,7 @@
           <a:p>
             <a:fld id="{3E6BC776-2618-4139-89AA-C416010F3F00}" type="datetimeFigureOut">
               <a:rPr lang="fi-FI" smtClean="0"/>
-              <a:t>19.10.2020</a:t>
+              <a:t>23.3.2021</a:t>
             </a:fld>
             <a:endParaRPr lang="fi-FI"/>
           </a:p>
@@ -3220,7 +3220,7 @@
           </a:lstStyle>
           <a:p>
             <a:r>
-              <a:rPr lang="en-US" smtClean="0"/>
+              <a:rPr lang="en-US"/>
               <a:t>Click to edit Master title style</a:t>
             </a:r>
             <a:endParaRPr lang="fi-FI"/>
@@ -3286,10 +3286,10 @@
           <a:p>
             <a:pPr lvl="0"/>
             <a:r>
-              <a:rPr lang="en-US" noProof="0" smtClean="0"/>
+              <a:rPr lang="en-US" noProof="0"/>
               <a:t>Click icon to add picture</a:t>
             </a:r>
-            <a:endParaRPr lang="fi-FI" noProof="0" smtClean="0"/>
+            <a:endParaRPr lang="fi-FI" noProof="0"/>
           </a:p>
         </p:txBody>
       </p:sp>
@@ -3352,7 +3352,7 @@
           <a:p>
             <a:pPr lvl="0"/>
             <a:r>
-              <a:rPr lang="en-US" smtClean="0"/>
+              <a:rPr lang="en-US"/>
               <a:t>Edit Master text styles</a:t>
             </a:r>
           </a:p>
@@ -3381,7 +3381,7 @@
           <a:p>
             <a:fld id="{3E6BC776-2618-4139-89AA-C416010F3F00}" type="datetimeFigureOut">
               <a:rPr lang="fi-FI" smtClean="0"/>
-              <a:t>19.10.2020</a:t>
+              <a:t>23.3.2021</a:t>
             </a:fld>
             <a:endParaRPr lang="fi-FI"/>
           </a:p>
@@ -3531,10 +3531,10 @@
           <a:p>
             <a:pPr lvl="0"/>
             <a:r>
-              <a:rPr lang="en-US" altLang="fi-FI" smtClean="0"/>
+              <a:rPr lang="en-US" altLang="fi-FI"/>
               <a:t>Click to edit Master title style</a:t>
             </a:r>
-            <a:endParaRPr lang="fi-FI" altLang="fi-FI" dirty="0" smtClean="0"/>
+            <a:endParaRPr lang="fi-FI" altLang="fi-FI" dirty="0"/>
           </a:p>
         </p:txBody>
       </p:sp>
@@ -3590,38 +3590,38 @@
           <a:p>
             <a:pPr lvl="0"/>
             <a:r>
-              <a:rPr lang="en-US" altLang="fi-FI" smtClean="0"/>
+              <a:rPr lang="en-US" altLang="fi-FI"/>
               <a:t>Edit Master text styles</a:t>
             </a:r>
           </a:p>
           <a:p>
             <a:pPr lvl="1"/>
             <a:r>
-              <a:rPr lang="en-US" altLang="fi-FI" smtClean="0"/>
+              <a:rPr lang="en-US" altLang="fi-FI"/>
               <a:t>Second level</a:t>
             </a:r>
           </a:p>
           <a:p>
             <a:pPr lvl="2"/>
             <a:r>
-              <a:rPr lang="en-US" altLang="fi-FI" smtClean="0"/>
+              <a:rPr lang="en-US" altLang="fi-FI"/>
               <a:t>Third level</a:t>
             </a:r>
           </a:p>
           <a:p>
             <a:pPr lvl="3"/>
             <a:r>
-              <a:rPr lang="en-US" altLang="fi-FI" smtClean="0"/>
+              <a:rPr lang="en-US" altLang="fi-FI"/>
               <a:t>Fourth level</a:t>
             </a:r>
           </a:p>
           <a:p>
             <a:pPr lvl="4"/>
             <a:r>
-              <a:rPr lang="en-US" altLang="fi-FI" smtClean="0"/>
+              <a:rPr lang="en-US" altLang="fi-FI"/>
               <a:t>Fifth level</a:t>
             </a:r>
-            <a:endParaRPr lang="fi-FI" altLang="fi-FI" smtClean="0"/>
+            <a:endParaRPr lang="fi-FI" altLang="fi-FI"/>
           </a:p>
         </p:txBody>
       </p:sp>
@@ -3687,7 +3687,7 @@
           <a:p>
             <a:fld id="{3E6BC776-2618-4139-89AA-C416010F3F00}" type="datetimeFigureOut">
               <a:rPr lang="fi-FI" smtClean="0"/>
-              <a:t>19.10.2020</a:t>
+              <a:t>23.3.2021</a:t>
             </a:fld>
             <a:endParaRPr lang="fi-FI"/>
           </a:p>
@@ -4049,7 +4049,7 @@
               <a:pPr>
                 <a:defRPr/>
               </a:pPr>
-              <a:endParaRPr lang="fi-FI" altLang="fi-FI" sz="1800" smtClean="0"/>
+              <a:endParaRPr lang="fi-FI" altLang="fi-FI" sz="1800"/>
             </a:p>
           </p:txBody>
         </p:sp>
@@ -4201,7 +4201,7 @@
               <a:pPr>
                 <a:defRPr/>
               </a:pPr>
-              <a:endParaRPr lang="fi-FI" altLang="fi-FI" sz="1800" smtClean="0"/>
+              <a:endParaRPr lang="fi-FI" altLang="fi-FI" sz="1800"/>
             </a:p>
           </p:txBody>
         </p:sp>
@@ -4353,7 +4353,7 @@
               <a:pPr>
                 <a:defRPr/>
               </a:pPr>
-              <a:endParaRPr lang="fi-FI" altLang="fi-FI" sz="1800" smtClean="0"/>
+              <a:endParaRPr lang="fi-FI" altLang="fi-FI" sz="1800"/>
             </a:p>
           </p:txBody>
         </p:sp>
@@ -4505,7 +4505,7 @@
               <a:pPr>
                 <a:defRPr/>
               </a:pPr>
-              <a:endParaRPr lang="fi-FI" altLang="fi-FI" sz="1800" smtClean="0"/>
+              <a:endParaRPr lang="fi-FI" altLang="fi-FI" sz="1800"/>
             </a:p>
           </p:txBody>
         </p:sp>
@@ -4657,7 +4657,7 @@
               <a:pPr>
                 <a:defRPr/>
               </a:pPr>
-              <a:endParaRPr lang="fi-FI" altLang="fi-FI" sz="1800" smtClean="0"/>
+              <a:endParaRPr lang="fi-FI" altLang="fi-FI" sz="1800"/>
             </a:p>
           </p:txBody>
         </p:sp>
@@ -4809,7 +4809,7 @@
               <a:pPr>
                 <a:defRPr/>
               </a:pPr>
-              <a:endParaRPr lang="fi-FI" altLang="fi-FI" sz="1800" smtClean="0"/>
+              <a:endParaRPr lang="fi-FI" altLang="fi-FI" sz="1800"/>
             </a:p>
           </p:txBody>
         </p:sp>
@@ -4836,13 +4836,6 @@
     <p:sldLayoutId id="2147483696" r:id="rId11"/>
     <p:sldLayoutId id="2147483697" r:id="rId12"/>
   </p:sldLayoutIdLst>
-  <p:timing>
-    <p:tnLst>
-      <p:par>
-        <p:cTn id="1" dur="indefinite" restart="never" nodeType="tmRoot"/>
-      </p:par>
-    </p:tnLst>
-  </p:timing>
   <p:txStyles>
     <p:titleStyle>
       <a:lvl1pPr algn="l" rtl="0" eaLnBrk="1" fontAlgn="base" hangingPunct="1">
@@ -5320,7 +5313,7 @@
           <a:bodyPr/>
           <a:lstStyle/>
           <a:p>
-            <a:endParaRPr lang="fi-FI" dirty="0" smtClean="0"/>
+            <a:endParaRPr lang="fi-FI" dirty="0"/>
           </a:p>
         </p:txBody>
       </p:sp>
@@ -5375,13 +5368,6 @@
   <p:clrMapOvr>
     <a:masterClrMapping/>
   </p:clrMapOvr>
-  <p:timing>
-    <p:tnLst>
-      <p:par>
-        <p:cTn id="1" dur="indefinite" restart="never" nodeType="tmRoot"/>
-      </p:par>
-    </p:tnLst>
-  </p:timing>
 </p:sld>
 </file>
 
@@ -5418,10 +5404,9 @@
           <a:lstStyle/>
           <a:p>
             <a:r>
-              <a:rPr lang="fi-FI" dirty="0" smtClean="0"/>
+              <a:rPr lang="fi-FI" dirty="0"/>
               <a:t>Uuden arvon asettaminen</a:t>
             </a:r>
-            <a:endParaRPr lang="fi-FI" dirty="0"/>
           </a:p>
         </p:txBody>
       </p:sp>
@@ -5444,16 +5429,11 @@
               <a:rPr lang="fi-FI" dirty="0"/>
               <a:t>Hajautustaulussa on jokaista avainta kohden korkeintaan yksi arvo. </a:t>
             </a:r>
-            <a:endParaRPr lang="fi-FI" dirty="0" smtClean="0"/>
-          </a:p>
-          <a:p>
-            <a:r>
-              <a:rPr lang="fi-FI" dirty="0" smtClean="0"/>
-              <a:t>Jos </a:t>
-            </a:r>
+          </a:p>
+          <a:p>
             <a:r>
               <a:rPr lang="fi-FI" dirty="0"/>
-              <a:t>hajautustauluun lisätään uusi avain-arvo -pari, missä avain on jo aiemmin liittynyt toiseen hajautustauluun tallennettuun arvoon, vanha arvo katoaa hajautustaulusta.</a:t>
+              <a:t>Jos hajautustauluun lisätään uusi avain-arvo -pari, missä avain on jo aiemmin liittynyt toiseen hajautustauluun tallennettuun arvoon, vanha arvo katoaa hajautustaulusta.</a:t>
             </a:r>
           </a:p>
         </p:txBody>
@@ -5492,22 +5472,13 @@
               <a:buNone/>
             </a:pPr>
             <a:r>
-              <a:rPr lang="en-US" sz="1400" dirty="0" smtClean="0">
-                <a:solidFill>
-                  <a:srgbClr val="000000"/>
-                </a:solidFill>
-                <a:latin typeface="Consolas" panose="020B0609020204030204" pitchFamily="49" charset="0"/>
-              </a:rPr>
-              <a:t>Map&lt;String</a:t>
-            </a:r>
-            <a:r>
               <a:rPr lang="en-US" sz="1400" dirty="0">
                 <a:solidFill>
                   <a:srgbClr val="000000"/>
                 </a:solidFill>
                 <a:latin typeface="Consolas" panose="020B0609020204030204" pitchFamily="49" charset="0"/>
               </a:rPr>
-              <a:t>, String&gt; </a:t>
+              <a:t>Map&lt;String, String&gt; </a:t>
             </a:r>
             <a:r>
               <a:rPr lang="en-US" sz="1400" dirty="0" err="1">
@@ -5886,19 +5857,10 @@
                 </a:solidFill>
                 <a:latin typeface="Consolas" panose="020B0609020204030204" pitchFamily="49" charset="0"/>
               </a:rPr>
-              <a:t>"Uno</a:t>
-            </a:r>
-            <a:r>
-              <a:rPr lang="fi-FI" sz="1400" dirty="0" smtClean="0">
-                <a:solidFill>
-                  <a:srgbClr val="2A00FF"/>
-                </a:solidFill>
-                <a:latin typeface="Consolas" panose="020B0609020204030204" pitchFamily="49" charset="0"/>
-              </a:rPr>
-              <a:t>"</a:t>
-            </a:r>
-            <a:r>
-              <a:rPr lang="fi-FI" sz="1400" dirty="0" smtClean="0">
+              <a:t>"Uno"</a:t>
+            </a:r>
+            <a:r>
+              <a:rPr lang="fi-FI" sz="1400" dirty="0">
                 <a:solidFill>
                   <a:srgbClr val="000000"/>
                 </a:solidFill>
@@ -6038,15 +6000,7 @@
             </a:r>
             <a:r>
               <a:rPr lang="fi-FI" sz="1200" dirty="0"/>
-              <a:t> </a:t>
-            </a:r>
-            <a:r>
-              <a:rPr lang="fi-FI" sz="1200" dirty="0" smtClean="0"/>
-              <a:t>–tutkimusryhmän oppimateriaalista, joka </a:t>
-            </a:r>
-            <a:r>
-              <a:rPr lang="fi-FI" sz="1200" dirty="0"/>
-              <a:t>on lisensoitu Creative </a:t>
+              <a:t> –tutkimusryhmän oppimateriaalista, joka on lisensoitu Creative </a:t>
             </a:r>
             <a:r>
               <a:rPr lang="fi-FI" sz="1200" dirty="0" err="1"/>
@@ -6054,23 +6008,18 @@
             </a:r>
             <a:r>
               <a:rPr lang="fi-FI" sz="1200" dirty="0"/>
+              <a:t> BY-NC-SA-lisenssillä. </a:t>
+            </a:r>
+            <a:r>
+              <a:rPr lang="fi-FI" sz="1200" dirty="0">
+                <a:hlinkClick r:id="rId2"/>
+              </a:rPr>
+              <a:t>https://2017-ohjelmointi.github.io/part8/</a:t>
+            </a:r>
+            <a:r>
+              <a:rPr lang="fi-FI" sz="1200" dirty="0"/>
               <a:t> </a:t>
             </a:r>
-            <a:r>
-              <a:rPr lang="fi-FI" sz="1200" dirty="0" smtClean="0"/>
-              <a:t>BY-NC-SA-lisenssillä. </a:t>
-            </a:r>
-            <a:r>
-              <a:rPr lang="fi-FI" sz="1200" dirty="0" smtClean="0">
-                <a:hlinkClick r:id="rId2"/>
-              </a:rPr>
-              <a:t>https://2017-ohjelmointi.github.io/part8/</a:t>
-            </a:r>
-            <a:r>
-              <a:rPr lang="fi-FI" sz="1200" dirty="0" smtClean="0"/>
-              <a:t> </a:t>
-            </a:r>
-            <a:endParaRPr lang="fi-FI" sz="1200" dirty="0"/>
           </a:p>
         </p:txBody>
       </p:sp>
@@ -6084,13 +6033,6 @@
   <p:clrMapOvr>
     <a:masterClrMapping/>
   </p:clrMapOvr>
-  <p:timing>
-    <p:tnLst>
-      <p:par>
-        <p:cTn id="1" dur="indefinite" restart="never" nodeType="tmRoot"/>
-      </p:par>
-    </p:tnLst>
-  </p:timing>
 </p:sld>
 </file>
 
@@ -6127,26 +6069,25 @@
           <a:lstStyle/>
           <a:p>
             <a:r>
-              <a:rPr lang="fi-FI" dirty="0" smtClean="0"/>
+              <a:rPr lang="fi-FI" dirty="0"/>
               <a:t>Arvojen poistaminen tai tarkastaminen (</a:t>
             </a:r>
             <a:r>
-              <a:rPr lang="fi-FI" dirty="0" err="1" smtClean="0"/>
+              <a:rPr lang="fi-FI" dirty="0" err="1"/>
               <a:t>remove</a:t>
             </a:r>
             <a:r>
-              <a:rPr lang="fi-FI" dirty="0" smtClean="0"/>
+              <a:rPr lang="fi-FI" dirty="0"/>
               <a:t> ja </a:t>
             </a:r>
             <a:r>
-              <a:rPr lang="fi-FI" dirty="0" err="1" smtClean="0"/>
+              <a:rPr lang="fi-FI" dirty="0" err="1"/>
               <a:t>containsKey</a:t>
             </a:r>
             <a:r>
-              <a:rPr lang="fi-FI" dirty="0" smtClean="0"/>
+              <a:rPr lang="fi-FI" dirty="0"/>
               <a:t>)</a:t>
             </a:r>
-            <a:endParaRPr lang="fi-FI" dirty="0"/>
           </a:p>
         </p:txBody>
       </p:sp>
@@ -6184,7 +6125,7 @@
               <a:buNone/>
             </a:pPr>
             <a:r>
-              <a:rPr lang="en-US" sz="1800" dirty="0" err="1" smtClean="0">
+              <a:rPr lang="en-US" sz="1800" dirty="0" err="1">
                 <a:solidFill>
                   <a:srgbClr val="000000"/>
                 </a:solidFill>
@@ -6193,22 +6134,13 @@
               <a:t>HashMap</a:t>
             </a:r>
             <a:r>
-              <a:rPr lang="en-US" sz="1800" dirty="0" smtClean="0">
-                <a:solidFill>
-                  <a:srgbClr val="000000"/>
-                </a:solidFill>
-                <a:latin typeface="Consolas" panose="020B0609020204030204" pitchFamily="49" charset="0"/>
-              </a:rPr>
-              <a:t>&lt;String</a:t>
-            </a:r>
-            <a:r>
               <a:rPr lang="en-US" sz="1800" dirty="0">
                 <a:solidFill>
                   <a:srgbClr val="000000"/>
                 </a:solidFill>
                 <a:latin typeface="Consolas" panose="020B0609020204030204" pitchFamily="49" charset="0"/>
               </a:rPr>
-              <a:t>, String&gt; </a:t>
+              <a:t>&lt;String, String&gt; </a:t>
             </a:r>
             <a:r>
               <a:rPr lang="en-US" sz="1800" dirty="0">
@@ -6747,13 +6679,6 @@
   <p:clrMapOvr>
     <a:masterClrMapping/>
   </p:clrMapOvr>
-  <p:timing>
-    <p:tnLst>
-      <p:par>
-        <p:cTn id="1" dur="indefinite" restart="never" nodeType="tmRoot"/>
-      </p:par>
-    </p:tnLst>
-  </p:timing>
 </p:sld>
 </file>
 
@@ -6790,14 +6715,13 @@
           <a:lstStyle/>
           <a:p>
             <a:r>
-              <a:rPr lang="fi-FI" dirty="0" err="1" smtClean="0"/>
+              <a:rPr lang="fi-FI" dirty="0" err="1"/>
               <a:t>Null</a:t>
             </a:r>
             <a:r>
-              <a:rPr lang="fi-FI" dirty="0" smtClean="0"/>
+              <a:rPr lang="fi-FI" dirty="0"/>
               <a:t>-viittaukset mapilta</a:t>
             </a:r>
-            <a:endParaRPr lang="fi-FI" dirty="0"/>
           </a:p>
         </p:txBody>
       </p:sp>
@@ -6817,11 +6741,11 @@
           <a:lstStyle/>
           <a:p>
             <a:r>
-              <a:rPr lang="fi-FI" dirty="0" smtClean="0"/>
+              <a:rPr lang="fi-FI" dirty="0"/>
               <a:t>Jos mapista haetaan arvoa avaimella, jota ei löydy, palautuu tuloksena </a:t>
             </a:r>
             <a:r>
-              <a:rPr lang="fi-FI" dirty="0" err="1" smtClean="0">
+              <a:rPr lang="fi-FI" dirty="0" err="1">
                 <a:solidFill>
                   <a:schemeClr val="accent2"/>
                 </a:solidFill>
@@ -6830,17 +6754,17 @@
               <a:t>null</a:t>
             </a:r>
             <a:r>
-              <a:rPr lang="fi-FI" dirty="0" smtClean="0"/>
+              <a:rPr lang="fi-FI" dirty="0"/>
               <a:t>-arvo</a:t>
             </a:r>
           </a:p>
           <a:p>
             <a:r>
-              <a:rPr lang="fi-FI" dirty="0" smtClean="0"/>
+              <a:rPr lang="fi-FI" dirty="0"/>
               <a:t>Mikäli </a:t>
             </a:r>
             <a:r>
-              <a:rPr lang="fi-FI" dirty="0" err="1" smtClean="0">
+              <a:rPr lang="fi-FI" dirty="0" err="1">
                 <a:solidFill>
                   <a:schemeClr val="accent2"/>
                 </a:solidFill>
@@ -6849,11 +6773,11 @@
               <a:t>null</a:t>
             </a:r>
             <a:r>
-              <a:rPr lang="fi-FI" dirty="0" smtClean="0"/>
+              <a:rPr lang="fi-FI" dirty="0"/>
               <a:t>-arvon sijasta halutaan käyttää jotain toista arvoa oletusarvona, voidaan käyttää </a:t>
             </a:r>
             <a:r>
-              <a:rPr lang="fi-FI" dirty="0" err="1" smtClean="0">
+              <a:rPr lang="fi-FI" dirty="0" err="1">
                 <a:solidFill>
                   <a:schemeClr val="accent2"/>
                 </a:solidFill>
@@ -6862,13 +6786,13 @@
               <a:t>getOrDefault</a:t>
             </a:r>
             <a:r>
-              <a:rPr lang="fi-FI" dirty="0" smtClean="0"/>
+              <a:rPr lang="fi-FI" dirty="0"/>
               <a:t>-metodia</a:t>
             </a:r>
           </a:p>
           <a:p>
             <a:r>
-              <a:rPr lang="fi-FI" dirty="0" smtClean="0"/>
+              <a:rPr lang="fi-FI" dirty="0"/>
               <a:t>Oheisessa esimerkissä ohjelma kaatuisi, mikäli oletusarvoa ei olisi annettu:</a:t>
             </a:r>
           </a:p>
@@ -6885,11 +6809,11 @@
               <a:t>null</a:t>
             </a:r>
             <a:r>
-              <a:rPr lang="fi-FI" dirty="0" smtClean="0"/>
+              <a:rPr lang="fi-FI" dirty="0"/>
               <a:t> -arvoa ei voida sijoittaa </a:t>
             </a:r>
             <a:r>
-              <a:rPr lang="fi-FI" dirty="0" err="1" smtClean="0">
+              <a:rPr lang="fi-FI" dirty="0" err="1">
                 <a:solidFill>
                   <a:schemeClr val="accent2"/>
                 </a:solidFill>
@@ -6899,10 +6823,9 @@
               <a:t>int</a:t>
             </a:r>
             <a:r>
-              <a:rPr lang="fi-FI" dirty="0" smtClean="0"/>
+              <a:rPr lang="fi-FI" dirty="0"/>
               <a:t> -tyyppiseen muuttujaan!</a:t>
             </a:r>
-            <a:endParaRPr lang="fi-FI" dirty="0"/>
           </a:p>
           <a:p>
             <a:endParaRPr lang="fi-FI" dirty="0"/>
@@ -7105,7 +7028,7 @@
             <a:pPr marL="0" indent="0">
               <a:buNone/>
             </a:pPr>
-            <a:endParaRPr lang="fi-FI" sz="1400" dirty="0" smtClean="0">
+            <a:endParaRPr lang="fi-FI" sz="1400" dirty="0">
               <a:latin typeface="Consolas" panose="020B0609020204030204" pitchFamily="49" charset="0"/>
             </a:endParaRPr>
           </a:p>
@@ -7120,16 +7043,116 @@
                 </a:solidFill>
                 <a:latin typeface="Consolas" panose="020B0609020204030204" pitchFamily="49" charset="0"/>
               </a:rPr>
-              <a:t>// </a:t>
-            </a:r>
-            <a:r>
-              <a:rPr lang="fi-FI" sz="1400" dirty="0" smtClean="0">
+              <a:t>// Muuttuja matti saa arvon 10:</a:t>
+            </a:r>
+          </a:p>
+          <a:p>
+            <a:pPr marL="0" indent="0">
+              <a:buNone/>
+            </a:pPr>
+            <a:r>
+              <a:rPr lang="fi-FI" sz="1400" dirty="0" err="1">
+                <a:solidFill>
+                  <a:srgbClr val="7F0055"/>
+                </a:solidFill>
+                <a:latin typeface="Consolas" panose="020B0609020204030204" pitchFamily="49" charset="0"/>
+              </a:rPr>
+              <a:t>int</a:t>
+            </a:r>
+            <a:r>
+              <a:rPr lang="fi-FI" sz="1400" dirty="0">
+                <a:solidFill>
+                  <a:srgbClr val="000000"/>
+                </a:solidFill>
+                <a:latin typeface="Consolas" panose="020B0609020204030204" pitchFamily="49" charset="0"/>
+              </a:rPr>
+              <a:t> </a:t>
+            </a:r>
+            <a:r>
+              <a:rPr lang="fi-FI" sz="1400" dirty="0">
+                <a:solidFill>
+                  <a:srgbClr val="6A3E3E"/>
+                </a:solidFill>
+                <a:latin typeface="Consolas" panose="020B0609020204030204" pitchFamily="49" charset="0"/>
+              </a:rPr>
+              <a:t>matti</a:t>
+            </a:r>
+            <a:r>
+              <a:rPr lang="fi-FI" sz="1400" dirty="0">
+                <a:solidFill>
+                  <a:srgbClr val="000000"/>
+                </a:solidFill>
+                <a:latin typeface="Consolas" panose="020B0609020204030204" pitchFamily="49" charset="0"/>
+              </a:rPr>
+              <a:t> = </a:t>
+            </a:r>
+            <a:r>
+              <a:rPr lang="fi-FI" sz="1400" dirty="0" err="1">
+                <a:solidFill>
+                  <a:srgbClr val="6A3E3E"/>
+                </a:solidFill>
+                <a:latin typeface="Consolas" panose="020B0609020204030204" pitchFamily="49" charset="0"/>
+              </a:rPr>
+              <a:t>pistelaskuri</a:t>
+            </a:r>
+            <a:r>
+              <a:rPr lang="fi-FI" sz="1400" dirty="0" err="1">
+                <a:solidFill>
+                  <a:srgbClr val="000000"/>
+                </a:solidFill>
+                <a:latin typeface="Consolas" panose="020B0609020204030204" pitchFamily="49" charset="0"/>
+              </a:rPr>
+              <a:t>.getOrDefault</a:t>
+            </a:r>
+            <a:r>
+              <a:rPr lang="fi-FI" sz="1400" dirty="0">
+                <a:solidFill>
+                  <a:srgbClr val="000000"/>
+                </a:solidFill>
+                <a:latin typeface="Consolas" panose="020B0609020204030204" pitchFamily="49" charset="0"/>
+              </a:rPr>
+              <a:t>(</a:t>
+            </a:r>
+            <a:r>
+              <a:rPr lang="fi-FI" sz="1400" dirty="0">
+                <a:solidFill>
+                  <a:srgbClr val="2A00FF"/>
+                </a:solidFill>
+                <a:latin typeface="Consolas" panose="020B0609020204030204" pitchFamily="49" charset="0"/>
+              </a:rPr>
+              <a:t>"Matti"</a:t>
+            </a:r>
+            <a:r>
+              <a:rPr lang="fi-FI" sz="1400" dirty="0">
+                <a:solidFill>
+                  <a:srgbClr val="000000"/>
+                </a:solidFill>
+                <a:latin typeface="Consolas" panose="020B0609020204030204" pitchFamily="49" charset="0"/>
+              </a:rPr>
+              <a:t>, 0);</a:t>
+            </a:r>
+          </a:p>
+          <a:p>
+            <a:pPr marL="0" indent="0">
+              <a:buNone/>
+            </a:pPr>
+            <a:r>
+              <a:rPr lang="fi-FI" sz="1400" dirty="0">
                 <a:solidFill>
                   <a:srgbClr val="3F7F5F"/>
                 </a:solidFill>
                 <a:latin typeface="Consolas" panose="020B0609020204030204" pitchFamily="49" charset="0"/>
               </a:rPr>
-              <a:t>Muuttuja matti </a:t>
+              <a:t>// Muuttuja </a:t>
+            </a:r>
+            <a:r>
+              <a:rPr lang="fi-FI" sz="1400" dirty="0" err="1">
+                <a:solidFill>
+                  <a:srgbClr val="3F7F5F"/>
+                </a:solidFill>
+                <a:latin typeface="Consolas" panose="020B0609020204030204" pitchFamily="49" charset="0"/>
+              </a:rPr>
+              <a:t>teppo</a:t>
             </a:r>
             <a:r>
               <a:rPr lang="fi-FI" sz="1400" dirty="0">
@@ -7138,30 +7161,15 @@
                 </a:solidFill>
                 <a:latin typeface="Consolas" panose="020B0609020204030204" pitchFamily="49" charset="0"/>
               </a:rPr>
-              <a:t>saa arvon </a:t>
-            </a:r>
-            <a:r>
-              <a:rPr lang="fi-FI" sz="1400" dirty="0" smtClean="0">
-                <a:solidFill>
-                  <a:srgbClr val="3F7F5F"/>
-                </a:solidFill>
-                <a:latin typeface="Consolas" panose="020B0609020204030204" pitchFamily="49" charset="0"/>
-              </a:rPr>
-              <a:t>10:</a:t>
-            </a:r>
-            <a:endParaRPr lang="fi-FI" sz="1400" dirty="0">
-              <a:solidFill>
-                <a:srgbClr val="3F7F5F"/>
-              </a:solidFill>
-              <a:latin typeface="Consolas" panose="020B0609020204030204" pitchFamily="49" charset="0"/>
-            </a:endParaRPr>
+              <a:t> saa arvon 0, avaimella ei arvoa:</a:t>
+            </a:r>
           </a:p>
           <a:p>
             <a:pPr marL="0" indent="0">
               <a:buNone/>
             </a:pPr>
             <a:r>
-              <a:rPr lang="fi-FI" sz="1400" dirty="0" err="1" smtClean="0">
+              <a:rPr lang="fi-FI" sz="1400" dirty="0" err="1">
                 <a:solidFill>
                   <a:srgbClr val="7F0055"/>
                 </a:solidFill>
@@ -7170,7 +7178,7 @@
               <a:t>int</a:t>
             </a:r>
             <a:r>
-              <a:rPr lang="fi-FI" sz="1400" dirty="0" smtClean="0">
+              <a:rPr lang="fi-FI" sz="1400" dirty="0">
                 <a:solidFill>
                   <a:srgbClr val="000000"/>
                 </a:solidFill>
@@ -7179,13 +7187,40 @@
               <a:t> </a:t>
             </a:r>
             <a:r>
+              <a:rPr lang="fi-FI" sz="1400" dirty="0" err="1">
+                <a:solidFill>
+                  <a:srgbClr val="6A3E3E"/>
+                </a:solidFill>
+                <a:latin typeface="Consolas" panose="020B0609020204030204" pitchFamily="49" charset="0"/>
+              </a:rPr>
+              <a:t>teppo</a:t>
+            </a:r>
+            <a:r>
               <a:rPr lang="fi-FI" sz="1400" dirty="0">
                 <a:solidFill>
+                  <a:srgbClr val="000000"/>
+                </a:solidFill>
+                <a:latin typeface="Consolas" panose="020B0609020204030204" pitchFamily="49" charset="0"/>
+              </a:rPr>
+              <a:t> = </a:t>
+            </a:r>
+            <a:r>
+              <a:rPr lang="fi-FI" sz="1400" dirty="0" err="1">
+                <a:solidFill>
                   <a:srgbClr val="6A3E3E"/>
                 </a:solidFill>
                 <a:latin typeface="Consolas" panose="020B0609020204030204" pitchFamily="49" charset="0"/>
               </a:rPr>
-              <a:t>matti</a:t>
+              <a:t>pistelaskuri</a:t>
+            </a:r>
+            <a:r>
+              <a:rPr lang="fi-FI" sz="1400" dirty="0" err="1">
+                <a:solidFill>
+                  <a:srgbClr val="000000"/>
+                </a:solidFill>
+                <a:latin typeface="Consolas" panose="020B0609020204030204" pitchFamily="49" charset="0"/>
+              </a:rPr>
+              <a:t>.getOrDefault</a:t>
             </a:r>
             <a:r>
               <a:rPr lang="fi-FI" sz="1400" dirty="0">
@@ -7194,212 +7229,25 @@
                 </a:solidFill>
                 <a:latin typeface="Consolas" panose="020B0609020204030204" pitchFamily="49" charset="0"/>
               </a:rPr>
-              <a:t> = </a:t>
-            </a:r>
-            <a:r>
-              <a:rPr lang="fi-FI" sz="1400" dirty="0" err="1">
-                <a:solidFill>
-                  <a:srgbClr val="6A3E3E"/>
-                </a:solidFill>
-                <a:latin typeface="Consolas" panose="020B0609020204030204" pitchFamily="49" charset="0"/>
-              </a:rPr>
-              <a:t>pistelaskuri</a:t>
-            </a:r>
-            <a:r>
-              <a:rPr lang="fi-FI" sz="1400" dirty="0" err="1">
-                <a:solidFill>
-                  <a:srgbClr val="000000"/>
-                </a:solidFill>
-                <a:latin typeface="Consolas" panose="020B0609020204030204" pitchFamily="49" charset="0"/>
-              </a:rPr>
-              <a:t>.getOrDefault</a:t>
+              <a:t>(</a:t>
             </a:r>
             <a:r>
               <a:rPr lang="fi-FI" sz="1400" dirty="0">
                 <a:solidFill>
-                  <a:srgbClr val="000000"/>
-                </a:solidFill>
-                <a:latin typeface="Consolas" panose="020B0609020204030204" pitchFamily="49" charset="0"/>
-              </a:rPr>
-              <a:t>(</a:t>
+                  <a:srgbClr val="2A00FF"/>
+                </a:solidFill>
+                <a:latin typeface="Consolas" panose="020B0609020204030204" pitchFamily="49" charset="0"/>
+              </a:rPr>
+              <a:t>"Teppo"</a:t>
             </a:r>
             <a:r>
               <a:rPr lang="fi-FI" sz="1400" dirty="0">
                 <a:solidFill>
-                  <a:srgbClr val="2A00FF"/>
-                </a:solidFill>
-                <a:latin typeface="Consolas" panose="020B0609020204030204" pitchFamily="49" charset="0"/>
-              </a:rPr>
-              <a:t>"Matti"</a:t>
-            </a:r>
-            <a:r>
-              <a:rPr lang="fi-FI" sz="1400" dirty="0">
-                <a:solidFill>
                   <a:srgbClr val="000000"/>
                 </a:solidFill>
                 <a:latin typeface="Consolas" panose="020B0609020204030204" pitchFamily="49" charset="0"/>
               </a:rPr>
               <a:t>, 0);</a:t>
-            </a:r>
-          </a:p>
-          <a:p>
-            <a:pPr marL="0" indent="0">
-              <a:buNone/>
-            </a:pPr>
-            <a:r>
-              <a:rPr lang="fi-FI" sz="1400" dirty="0">
-                <a:solidFill>
-                  <a:srgbClr val="3F7F5F"/>
-                </a:solidFill>
-                <a:latin typeface="Consolas" panose="020B0609020204030204" pitchFamily="49" charset="0"/>
-              </a:rPr>
-              <a:t>// </a:t>
-            </a:r>
-            <a:r>
-              <a:rPr lang="fi-FI" sz="1400" dirty="0" smtClean="0">
-                <a:solidFill>
-                  <a:srgbClr val="3F7F5F"/>
-                </a:solidFill>
-                <a:latin typeface="Consolas" panose="020B0609020204030204" pitchFamily="49" charset="0"/>
-              </a:rPr>
-              <a:t>Muuttuja </a:t>
-            </a:r>
-            <a:r>
-              <a:rPr lang="fi-FI" sz="1400" dirty="0" err="1" smtClean="0">
-                <a:solidFill>
-                  <a:srgbClr val="3F7F5F"/>
-                </a:solidFill>
-                <a:latin typeface="Consolas" panose="020B0609020204030204" pitchFamily="49" charset="0"/>
-              </a:rPr>
-              <a:t>teppo</a:t>
-            </a:r>
-            <a:r>
-              <a:rPr lang="fi-FI" sz="1400" dirty="0" smtClean="0">
-                <a:solidFill>
-                  <a:srgbClr val="3F7F5F"/>
-                </a:solidFill>
-                <a:latin typeface="Consolas" panose="020B0609020204030204" pitchFamily="49" charset="0"/>
-              </a:rPr>
-              <a:t> </a:t>
-            </a:r>
-            <a:r>
-              <a:rPr lang="fi-FI" sz="1400" dirty="0">
-                <a:solidFill>
-                  <a:srgbClr val="3F7F5F"/>
-                </a:solidFill>
-                <a:latin typeface="Consolas" panose="020B0609020204030204" pitchFamily="49" charset="0"/>
-              </a:rPr>
-              <a:t>saa arvon </a:t>
-            </a:r>
-            <a:r>
-              <a:rPr lang="fi-FI" sz="1400" dirty="0" smtClean="0">
-                <a:solidFill>
-                  <a:srgbClr val="3F7F5F"/>
-                </a:solidFill>
-                <a:latin typeface="Consolas" panose="020B0609020204030204" pitchFamily="49" charset="0"/>
-              </a:rPr>
-              <a:t>0, avaimella ei arvoa:</a:t>
-            </a:r>
-            <a:endParaRPr lang="fi-FI" sz="1400" dirty="0">
-              <a:solidFill>
-                <a:srgbClr val="3F7F5F"/>
-              </a:solidFill>
-              <a:latin typeface="Consolas" panose="020B0609020204030204" pitchFamily="49" charset="0"/>
-            </a:endParaRPr>
-          </a:p>
-          <a:p>
-            <a:pPr marL="0" indent="0">
-              <a:buNone/>
-            </a:pPr>
-            <a:r>
-              <a:rPr lang="fi-FI" sz="1400" dirty="0" err="1" smtClean="0">
-                <a:solidFill>
-                  <a:srgbClr val="7F0055"/>
-                </a:solidFill>
-                <a:latin typeface="Consolas" panose="020B0609020204030204" pitchFamily="49" charset="0"/>
-              </a:rPr>
-              <a:t>int</a:t>
-            </a:r>
-            <a:r>
-              <a:rPr lang="fi-FI" sz="1400" dirty="0" smtClean="0">
-                <a:solidFill>
-                  <a:srgbClr val="000000"/>
-                </a:solidFill>
-                <a:latin typeface="Consolas" panose="020B0609020204030204" pitchFamily="49" charset="0"/>
-              </a:rPr>
-              <a:t> </a:t>
-            </a:r>
-            <a:r>
-              <a:rPr lang="fi-FI" sz="1400" dirty="0" err="1">
-                <a:solidFill>
-                  <a:srgbClr val="6A3E3E"/>
-                </a:solidFill>
-                <a:latin typeface="Consolas" panose="020B0609020204030204" pitchFamily="49" charset="0"/>
-              </a:rPr>
-              <a:t>teppo</a:t>
-            </a:r>
-            <a:r>
-              <a:rPr lang="fi-FI" sz="1400" dirty="0">
-                <a:solidFill>
-                  <a:srgbClr val="000000"/>
-                </a:solidFill>
-                <a:latin typeface="Consolas" panose="020B0609020204030204" pitchFamily="49" charset="0"/>
-              </a:rPr>
-              <a:t> = </a:t>
-            </a:r>
-            <a:r>
-              <a:rPr lang="fi-FI" sz="1400" dirty="0" err="1">
-                <a:solidFill>
-                  <a:srgbClr val="6A3E3E"/>
-                </a:solidFill>
-                <a:latin typeface="Consolas" panose="020B0609020204030204" pitchFamily="49" charset="0"/>
-              </a:rPr>
-              <a:t>pistelaskuri</a:t>
-            </a:r>
-            <a:r>
-              <a:rPr lang="fi-FI" sz="1400" dirty="0" err="1">
-                <a:solidFill>
-                  <a:srgbClr val="000000"/>
-                </a:solidFill>
-                <a:latin typeface="Consolas" panose="020B0609020204030204" pitchFamily="49" charset="0"/>
-              </a:rPr>
-              <a:t>.getOrDefault</a:t>
-            </a:r>
-            <a:r>
-              <a:rPr lang="fi-FI" sz="1400" dirty="0">
-                <a:solidFill>
-                  <a:srgbClr val="000000"/>
-                </a:solidFill>
-                <a:latin typeface="Consolas" panose="020B0609020204030204" pitchFamily="49" charset="0"/>
-              </a:rPr>
-              <a:t>(</a:t>
-            </a:r>
-            <a:r>
-              <a:rPr lang="fi-FI" sz="1400" dirty="0">
-                <a:solidFill>
-                  <a:srgbClr val="2A00FF"/>
-                </a:solidFill>
-                <a:latin typeface="Consolas" panose="020B0609020204030204" pitchFamily="49" charset="0"/>
-              </a:rPr>
-              <a:t>"Teppo"</a:t>
-            </a:r>
-            <a:r>
-              <a:rPr lang="fi-FI" sz="1400" dirty="0">
-                <a:solidFill>
-                  <a:srgbClr val="000000"/>
-                </a:solidFill>
-                <a:latin typeface="Consolas" panose="020B0609020204030204" pitchFamily="49" charset="0"/>
-              </a:rPr>
-              <a:t>, 0</a:t>
-            </a:r>
-            <a:r>
-              <a:rPr lang="fi-FI" sz="1400" dirty="0" smtClean="0">
-                <a:solidFill>
-                  <a:srgbClr val="000000"/>
-                </a:solidFill>
-                <a:latin typeface="Consolas" panose="020B0609020204030204" pitchFamily="49" charset="0"/>
-              </a:rPr>
-              <a:t>);</a:t>
             </a:r>
           </a:p>
           <a:p>
@@ -7421,16 +7269,16 @@
                 </a:solidFill>
                 <a:latin typeface="Consolas" panose="020B0609020204030204" pitchFamily="49" charset="0"/>
               </a:rPr>
-              <a:t>// </a:t>
-            </a:r>
-            <a:r>
-              <a:rPr lang="fi-FI" sz="1400" dirty="0" smtClean="0">
+              <a:t>// Seuraava käsky kaataa ohjelman, koska </a:t>
+            </a:r>
+            <a:r>
+              <a:rPr lang="fi-FI" sz="1400" dirty="0" err="1">
                 <a:solidFill>
                   <a:srgbClr val="3F7F5F"/>
                 </a:solidFill>
                 <a:latin typeface="Consolas" panose="020B0609020204030204" pitchFamily="49" charset="0"/>
               </a:rPr>
-              <a:t>Seuraava käsky kaataa </a:t>
+              <a:t>int</a:t>
             </a:r>
             <a:r>
               <a:rPr lang="fi-FI" sz="1400" dirty="0">
@@ -7439,17 +7287,27 @@
                 </a:solidFill>
                 <a:latin typeface="Consolas" panose="020B0609020204030204" pitchFamily="49" charset="0"/>
               </a:rPr>
-              <a:t>ohjelman, koska </a:t>
-            </a:r>
-            <a:r>
-              <a:rPr lang="fi-FI" sz="1400" dirty="0" err="1">
+              <a:t> ei ole</a:t>
+            </a:r>
+          </a:p>
+          <a:p>
+            <a:pPr marL="0" indent="0">
+              <a:buNone/>
+            </a:pPr>
+            <a:r>
+              <a:rPr lang="fi-FI" sz="1400" dirty="0">
                 <a:solidFill>
                   <a:srgbClr val="3F7F5F"/>
                 </a:solidFill>
                 <a:latin typeface="Consolas" panose="020B0609020204030204" pitchFamily="49" charset="0"/>
               </a:rPr>
-              <a:t>int</a:t>
-            </a:r>
+              <a:t>// viittaustyyppinen muuttuja ja Kaija-avaimelle ei</a:t>
+            </a:r>
+          </a:p>
+          <a:p>
+            <a:pPr marL="0" indent="0">
+              <a:buNone/>
+            </a:pPr>
             <a:r>
               <a:rPr lang="fi-FI" sz="1400" dirty="0">
                 <a:solidFill>
@@ -7457,71 +7315,7 @@
                 </a:solidFill>
                 <a:latin typeface="Consolas" panose="020B0609020204030204" pitchFamily="49" charset="0"/>
               </a:rPr>
-              <a:t> ei </a:t>
-            </a:r>
-            <a:r>
-              <a:rPr lang="fi-FI" sz="1400" dirty="0" smtClean="0">
-                <a:solidFill>
-                  <a:srgbClr val="3F7F5F"/>
-                </a:solidFill>
-                <a:latin typeface="Consolas" panose="020B0609020204030204" pitchFamily="49" charset="0"/>
-              </a:rPr>
-              <a:t>ole</a:t>
-            </a:r>
-          </a:p>
-          <a:p>
-            <a:pPr marL="0" indent="0">
-              <a:buNone/>
-            </a:pPr>
-            <a:r>
-              <a:rPr lang="fi-FI" sz="1400" dirty="0" smtClean="0">
-                <a:solidFill>
-                  <a:srgbClr val="3F7F5F"/>
-                </a:solidFill>
-                <a:latin typeface="Consolas" panose="020B0609020204030204" pitchFamily="49" charset="0"/>
-              </a:rPr>
-              <a:t>// viittaustyyppinen </a:t>
-            </a:r>
-            <a:r>
-              <a:rPr lang="fi-FI" sz="1400" dirty="0">
-                <a:solidFill>
-                  <a:srgbClr val="3F7F5F"/>
-                </a:solidFill>
-                <a:latin typeface="Consolas" panose="020B0609020204030204" pitchFamily="49" charset="0"/>
-              </a:rPr>
-              <a:t>muuttuja </a:t>
-            </a:r>
-            <a:r>
-              <a:rPr lang="fi-FI" sz="1400" dirty="0" smtClean="0">
-                <a:solidFill>
-                  <a:srgbClr val="3F7F5F"/>
-                </a:solidFill>
-                <a:latin typeface="Consolas" panose="020B0609020204030204" pitchFamily="49" charset="0"/>
-              </a:rPr>
-              <a:t>ja Kaija-avaimelle ei</a:t>
-            </a:r>
-          </a:p>
-          <a:p>
-            <a:pPr marL="0" indent="0">
-              <a:buNone/>
-            </a:pPr>
-            <a:r>
-              <a:rPr lang="fi-FI" sz="1400" dirty="0" smtClean="0">
-                <a:solidFill>
-                  <a:srgbClr val="3F7F5F"/>
-                </a:solidFill>
-                <a:latin typeface="Consolas" panose="020B0609020204030204" pitchFamily="49" charset="0"/>
-              </a:rPr>
-              <a:t>// </a:t>
-            </a:r>
-            <a:r>
-              <a:rPr lang="fi-FI" sz="1400" dirty="0">
-                <a:solidFill>
-                  <a:srgbClr val="3F7F5F"/>
-                </a:solidFill>
-                <a:latin typeface="Consolas" panose="020B0609020204030204" pitchFamily="49" charset="0"/>
-              </a:rPr>
-              <a:t>löydy arvoa:</a:t>
+              <a:t>// löydy arvoa:</a:t>
             </a:r>
           </a:p>
           <a:p>
@@ -7656,26 +7450,25 @@
             <a:lstStyle/>
             <a:p>
               <a:r>
-                <a:rPr lang="fi-FI" sz="1200" dirty="0" smtClean="0"/>
+                <a:rPr lang="fi-FI" sz="1200" dirty="0"/>
                 <a:t>Palauttaa </a:t>
               </a:r>
               <a:r>
-                <a:rPr lang="fi-FI" sz="1200" dirty="0" err="1" smtClean="0"/>
+                <a:rPr lang="fi-FI" sz="1200" dirty="0" err="1"/>
                 <a:t>null</a:t>
               </a:r>
               <a:r>
-                <a:rPr lang="fi-FI" sz="1200" dirty="0" smtClean="0"/>
+                <a:rPr lang="fi-FI" sz="1200" dirty="0"/>
                 <a:t>-arvon, jota ei voida sijoittaa alkeistyyppiseen </a:t>
               </a:r>
               <a:r>
-                <a:rPr lang="fi-FI" sz="1200" dirty="0" err="1" smtClean="0"/>
+                <a:rPr lang="fi-FI" sz="1200" dirty="0" err="1"/>
                 <a:t>int</a:t>
               </a:r>
               <a:r>
-                <a:rPr lang="fi-FI" sz="1200" dirty="0" smtClean="0"/>
+                <a:rPr lang="fi-FI" sz="1200" dirty="0"/>
                 <a:t>-muuttujaan: ohjelma kaatuu</a:t>
               </a:r>
-              <a:endParaRPr lang="fi-FI" sz="1200" dirty="0"/>
             </a:p>
           </p:txBody>
         </p:sp>
@@ -7857,48 +7650,26 @@
           <a:p>
             <a:pPr algn="ctr"/>
             <a:r>
-              <a:rPr lang="fi-FI" dirty="0" smtClean="0"/>
-              <a:t>Demo </a:t>
-            </a:r>
-            <a:r>
-              <a:rPr lang="fi-FI" dirty="0" smtClean="0"/>
-              <a:t>kokoelmista </a:t>
-            </a:r>
-            <a:r>
-              <a:rPr lang="fi-FI" dirty="0" smtClean="0"/>
-              <a:t>ja viittauksista:</a:t>
-            </a:r>
-            <a:br>
-              <a:rPr lang="fi-FI" dirty="0" smtClean="0"/>
-            </a:br>
-            <a:r>
               <a:rPr lang="fi-FI" dirty="0"/>
-              <a:t/>
+              <a:t>Demo kokoelmista ja viittauksista:</a:t>
             </a:r>
             <a:br>
               <a:rPr lang="fi-FI" dirty="0"/>
             </a:br>
-            <a:r>
-              <a:rPr lang="fi-FI" dirty="0"/>
-              <a:t/>
-            </a:r>
             <a:br>
               <a:rPr lang="fi-FI" dirty="0"/>
             </a:br>
+            <a:br>
+              <a:rPr lang="fi-FI" dirty="0"/>
+            </a:br>
             <a:r>
               <a:rPr lang="fi-FI" sz="1200" dirty="0">
                 <a:hlinkClick r:id="rId2"/>
               </a:rPr>
-              <a:t>https://</a:t>
-            </a:r>
-            <a:r>
-              <a:rPr lang="fi-FI" sz="1200" dirty="0" smtClean="0">
-                <a:hlinkClick r:id="rId2"/>
-              </a:rPr>
-              <a:t>video.haaga-helia.fi/media/HashMap%2C+useiden+arvojen+tallentaminen+samalle+avaimelle/0_1xnwercr</a:t>
-            </a:r>
-            <a:r>
-              <a:rPr lang="fi-FI" sz="1200" dirty="0" smtClean="0"/>
+              <a:t>https://video.haaga-helia.fi/media/HashMap%2C+useiden+arvojen+tallentaminen+samalle+avaimelle/0_1xnwercr</a:t>
+            </a:r>
+            <a:r>
+              <a:rPr lang="fi-FI" sz="1200" dirty="0"/>
               <a:t> </a:t>
             </a:r>
             <a:endParaRPr lang="fi-FI" dirty="0"/>
@@ -7965,13 +7736,6 @@
   <p:clrMapOvr>
     <a:masterClrMapping/>
   </p:clrMapOvr>
-  <p:timing>
-    <p:tnLst>
-      <p:par>
-        <p:cTn id="1" dur="indefinite" restart="never" nodeType="tmRoot"/>
-      </p:par>
-    </p:tnLst>
-  </p:timing>
 </p:sld>
 </file>
 
@@ -8008,14 +7772,13 @@
           <a:lstStyle/>
           <a:p>
             <a:r>
-              <a:rPr lang="fi-FI" i="1" dirty="0" smtClean="0"/>
+              <a:rPr lang="fi-FI" i="1" dirty="0"/>
               <a:t>Syventävää tietoa:</a:t>
             </a:r>
             <a:r>
-              <a:rPr lang="fi-FI" dirty="0" smtClean="0"/>
+              <a:rPr lang="fi-FI" dirty="0"/>
               <a:t> usean arvon tallentaminen samalle avaimelle</a:t>
             </a:r>
-            <a:endParaRPr lang="fi-FI" dirty="0"/>
           </a:p>
         </p:txBody>
       </p:sp>
@@ -8035,42 +7798,42 @@
           <a:lstStyle/>
           <a:p>
             <a:r>
-              <a:rPr lang="fi-FI" sz="2000" dirty="0" err="1" smtClean="0"/>
+              <a:rPr lang="fi-FI" sz="2000" dirty="0" err="1"/>
               <a:t>Map:issa</a:t>
             </a:r>
             <a:r>
-              <a:rPr lang="fi-FI" sz="2000" dirty="0" smtClean="0"/>
+              <a:rPr lang="fi-FI" sz="2000" dirty="0"/>
               <a:t> voidaan säilyttää vain yhtä arvoa kutakin avainta kohden.</a:t>
             </a:r>
           </a:p>
           <a:p>
             <a:r>
-              <a:rPr lang="fi-FI" sz="2000" dirty="0" smtClean="0"/>
+              <a:rPr lang="fi-FI" sz="2000" dirty="0"/>
               <a:t>Säilytettävät arvot voivat kuitenkin olla kokoelmia.</a:t>
             </a:r>
           </a:p>
           <a:p>
             <a:pPr lvl="1"/>
             <a:r>
-              <a:rPr lang="fi-FI" sz="1600" dirty="0" smtClean="0"/>
+              <a:rPr lang="fi-FI" sz="1600" dirty="0"/>
               <a:t>Kokoelmat ovat olioita siinä missä muutkin oliot.</a:t>
             </a:r>
           </a:p>
           <a:p>
             <a:r>
-              <a:rPr lang="fi-FI" sz="2000" dirty="0" err="1" smtClean="0"/>
+              <a:rPr lang="fi-FI" sz="2000" dirty="0" err="1"/>
               <a:t>Map:issa</a:t>
             </a:r>
             <a:r>
-              <a:rPr lang="fi-FI" sz="2000" dirty="0" smtClean="0"/>
+              <a:rPr lang="fi-FI" sz="2000" dirty="0"/>
               <a:t> voidaan siis (tavallaan) säilyttää samalla avaimella useita arvoja, kun </a:t>
             </a:r>
             <a:r>
-              <a:rPr lang="fi-FI" sz="2000" dirty="0" err="1" smtClean="0"/>
+              <a:rPr lang="fi-FI" sz="2000" dirty="0" err="1"/>
               <a:t>käsittelemmä</a:t>
             </a:r>
             <a:r>
-              <a:rPr lang="fi-FI" sz="2000" dirty="0" smtClean="0"/>
+              <a:rPr lang="fi-FI" sz="2000" dirty="0"/>
               <a:t> Mapin sisällä listoja tai muita kokoelmia.</a:t>
             </a:r>
           </a:p>
@@ -8082,7 +7845,7 @@
               <a:buNone/>
             </a:pPr>
             <a:r>
-              <a:rPr lang="fi-FI" sz="2000" dirty="0" smtClean="0"/>
+              <a:rPr lang="fi-FI" sz="2000" dirty="0"/>
               <a:t>Oikealla oleva esimerkki tulostaa:</a:t>
             </a:r>
           </a:p>
@@ -9263,18 +9026,13 @@
           <a:lstStyle/>
           <a:p>
             <a:r>
-              <a:rPr lang="fi-FI" dirty="0" smtClean="0">
+              <a:rPr lang="fi-FI" dirty="0">
                 <a:solidFill>
                   <a:srgbClr val="3F7F5F"/>
                 </a:solidFill>
               </a:rPr>
               <a:t>maat</a:t>
             </a:r>
-            <a:endParaRPr lang="fi-FI" dirty="0">
-              <a:solidFill>
-                <a:srgbClr val="3F7F5F"/>
-              </a:solidFill>
-            </a:endParaRPr>
           </a:p>
         </p:txBody>
       </p:sp>
@@ -9301,7 +9059,7 @@
           <a:lstStyle/>
           <a:p>
             <a:r>
-              <a:rPr lang="fi-FI" dirty="0" err="1" smtClean="0">
+              <a:rPr lang="fi-FI" dirty="0" err="1">
                 <a:solidFill>
                   <a:srgbClr val="3F7F5F"/>
                 </a:solidFill>
@@ -9339,7 +9097,7 @@
           <a:lstStyle/>
           <a:p>
             <a:r>
-              <a:rPr lang="fi-FI" dirty="0" err="1" smtClean="0">
+              <a:rPr lang="fi-FI" dirty="0" err="1">
                 <a:solidFill>
                   <a:srgbClr val="3F7F5F"/>
                 </a:solidFill>
@@ -9377,18 +9135,13 @@
           <a:lstStyle/>
           <a:p>
             <a:r>
-              <a:rPr lang="fi-FI" dirty="0" smtClean="0">
+              <a:rPr lang="fi-FI" dirty="0">
                 <a:solidFill>
                   <a:srgbClr val="3F7F5F"/>
                 </a:solidFill>
               </a:rPr>
               <a:t>kaupungit</a:t>
             </a:r>
-            <a:endParaRPr lang="fi-FI" dirty="0">
-              <a:solidFill>
-                <a:srgbClr val="3F7F5F"/>
-              </a:solidFill>
-            </a:endParaRPr>
           </a:p>
         </p:txBody>
       </p:sp>
@@ -9415,10 +9168,9 @@
           <a:lstStyle/>
           <a:p>
             <a:r>
-              <a:rPr lang="fi-FI" b="1" dirty="0" smtClean="0"/>
+              <a:rPr lang="fi-FI" b="1" dirty="0"/>
               <a:t>Muuttujat</a:t>
             </a:r>
-            <a:endParaRPr lang="fi-FI" b="1" dirty="0"/>
           </a:p>
         </p:txBody>
       </p:sp>
@@ -9483,10 +9235,9 @@
                     <a:lstStyle/>
                     <a:p>
                       <a:r>
-                        <a:rPr lang="fi-FI" dirty="0" smtClean="0"/>
+                        <a:rPr lang="fi-FI" dirty="0"/>
                         <a:t>Helsinki</a:t>
                       </a:r>
-                      <a:endParaRPr lang="fi-FI" dirty="0"/>
                     </a:p>
                   </a:txBody>
                   <a:tcPr/>
@@ -9497,10 +9248,9 @@
                     <a:lstStyle/>
                     <a:p>
                       <a:r>
-                        <a:rPr lang="fi-FI" dirty="0" smtClean="0"/>
+                        <a:rPr lang="fi-FI" dirty="0"/>
                         <a:t>Espoo</a:t>
                       </a:r>
-                      <a:endParaRPr lang="fi-FI" dirty="0"/>
                     </a:p>
                   </a:txBody>
                   <a:tcPr/>
@@ -9511,10 +9261,9 @@
                     <a:lstStyle/>
                     <a:p>
                       <a:r>
-                        <a:rPr lang="fi-FI" dirty="0" smtClean="0"/>
+                        <a:rPr lang="fi-FI" dirty="0"/>
                         <a:t>Vantaa</a:t>
                       </a:r>
-                      <a:endParaRPr lang="fi-FI" dirty="0"/>
                     </a:p>
                   </a:txBody>
                   <a:tcPr/>
@@ -9525,10 +9274,9 @@
                     <a:lstStyle/>
                     <a:p>
                       <a:r>
-                        <a:rPr lang="fi-FI" dirty="0" smtClean="0"/>
+                        <a:rPr lang="fi-FI" dirty="0"/>
                         <a:t>Turku</a:t>
                       </a:r>
-                      <a:endParaRPr lang="fi-FI" dirty="0"/>
                     </a:p>
                   </a:txBody>
                   <a:tcPr/>
@@ -9590,10 +9338,9 @@
                     <a:lstStyle/>
                     <a:p>
                       <a:r>
-                        <a:rPr lang="fi-FI" dirty="0" smtClean="0"/>
+                        <a:rPr lang="fi-FI" dirty="0"/>
                         <a:t>Tukholma</a:t>
                       </a:r>
-                      <a:endParaRPr lang="fi-FI" dirty="0"/>
                     </a:p>
                   </a:txBody>
                   <a:tcPr/>
@@ -9604,10 +9351,9 @@
                     <a:lstStyle/>
                     <a:p>
                       <a:r>
-                        <a:rPr lang="fi-FI" dirty="0" smtClean="0"/>
+                        <a:rPr lang="fi-FI" dirty="0"/>
                         <a:t>Visby</a:t>
                       </a:r>
-                      <a:endParaRPr lang="fi-FI" dirty="0"/>
                     </a:p>
                   </a:txBody>
                   <a:tcPr/>
@@ -9669,10 +9415,9 @@
                     <a:lstStyle/>
                     <a:p>
                       <a:r>
-                        <a:rPr lang="fi-FI" i="1" dirty="0" smtClean="0"/>
+                        <a:rPr lang="fi-FI" i="1" dirty="0"/>
                         <a:t>Avain</a:t>
                       </a:r>
-                      <a:endParaRPr lang="fi-FI" i="1" dirty="0"/>
                     </a:p>
                   </a:txBody>
                   <a:tcPr/>
@@ -9683,10 +9428,9 @@
                     <a:lstStyle/>
                     <a:p>
                       <a:r>
-                        <a:rPr lang="fi-FI" i="1" dirty="0" smtClean="0"/>
+                        <a:rPr lang="fi-FI" i="1" dirty="0"/>
                         <a:t>Arvo</a:t>
                       </a:r>
-                      <a:endParaRPr lang="fi-FI" i="1" dirty="0"/>
                     </a:p>
                   </a:txBody>
                   <a:tcPr/>
@@ -9704,10 +9448,9 @@
                     <a:lstStyle/>
                     <a:p>
                       <a:r>
-                        <a:rPr lang="fi-FI" dirty="0" smtClean="0"/>
+                        <a:rPr lang="fi-FI" dirty="0"/>
                         <a:t>Suomi</a:t>
                       </a:r>
-                      <a:endParaRPr lang="fi-FI" dirty="0"/>
                     </a:p>
                   </a:txBody>
                   <a:tcPr/>
@@ -9735,10 +9478,9 @@
                     <a:lstStyle/>
                     <a:p>
                       <a:r>
-                        <a:rPr lang="fi-FI" dirty="0" smtClean="0"/>
+                        <a:rPr lang="fi-FI" dirty="0"/>
                         <a:t>Ruotsi</a:t>
                       </a:r>
-                      <a:endParaRPr lang="fi-FI" dirty="0"/>
                     </a:p>
                   </a:txBody>
                   <a:tcPr/>
@@ -9786,10 +9528,9 @@
           <a:lstStyle/>
           <a:p>
             <a:r>
-              <a:rPr lang="fi-FI" b="1" dirty="0" smtClean="0"/>
+              <a:rPr lang="fi-FI" b="1" dirty="0"/>
               <a:t>Oliot</a:t>
             </a:r>
-            <a:endParaRPr lang="fi-FI" b="1" dirty="0"/>
           </a:p>
         </p:txBody>
       </p:sp>
@@ -10072,7 +9813,7 @@
           <a:lstStyle/>
           <a:p>
             <a:r>
-              <a:rPr lang="fi-FI" sz="1100" i="1" dirty="0" err="1" smtClean="0"/>
+              <a:rPr lang="fi-FI" sz="1100" i="1" dirty="0" err="1"/>
               <a:t>HashMap</a:t>
             </a:r>
             <a:endParaRPr lang="fi-FI" sz="1100" i="1" dirty="0"/>
@@ -10102,7 +9843,7 @@
           <a:lstStyle/>
           <a:p>
             <a:r>
-              <a:rPr lang="fi-FI" sz="1100" i="1" dirty="0" err="1" smtClean="0"/>
+              <a:rPr lang="fi-FI" sz="1100" i="1" dirty="0" err="1"/>
               <a:t>ArrayList</a:t>
             </a:r>
             <a:endParaRPr lang="fi-FI" sz="1100" i="1" dirty="0"/>
@@ -10132,7 +9873,7 @@
           <a:lstStyle/>
           <a:p>
             <a:r>
-              <a:rPr lang="fi-FI" sz="1100" i="1" dirty="0" err="1" smtClean="0"/>
+              <a:rPr lang="fi-FI" sz="1100" i="1" dirty="0" err="1"/>
               <a:t>ArrayList</a:t>
             </a:r>
             <a:endParaRPr lang="fi-FI" sz="1100" i="1" dirty="0"/>
@@ -10162,18 +9903,17 @@
           <a:lstStyle/>
           <a:p>
             <a:r>
-              <a:rPr lang="fi-FI" sz="1600" dirty="0" smtClean="0"/>
+              <a:rPr lang="fi-FI" sz="1600" dirty="0"/>
               <a:t>Edellisen kalvon tietorakenteiden visualisointi: muistissa on vain kaksi listaa, joihin viitataan useilla muuttujilla ja </a:t>
             </a:r>
             <a:r>
-              <a:rPr lang="fi-FI" sz="1600" dirty="0" err="1" smtClean="0"/>
+              <a:rPr lang="fi-FI" sz="1600" dirty="0" err="1"/>
               <a:t>map:in</a:t>
             </a:r>
             <a:r>
-              <a:rPr lang="fi-FI" sz="1600" dirty="0" smtClean="0"/>
+              <a:rPr lang="fi-FI" sz="1600" dirty="0"/>
               <a:t> sisällä.</a:t>
             </a:r>
-            <a:endParaRPr lang="fi-FI" sz="1600" dirty="0"/>
           </a:p>
         </p:txBody>
       </p:sp>
@@ -10187,13 +9927,6 @@
   <p:clrMapOvr>
     <a:masterClrMapping/>
   </p:clrMapOvr>
-  <p:timing>
-    <p:tnLst>
-      <p:par>
-        <p:cTn id="1" dur="indefinite" restart="never" nodeType="tmRoot"/>
-      </p:par>
-    </p:tnLst>
-  </p:timing>
 </p:sld>
 </file>
 
@@ -10230,11 +9963,7 @@
           <a:lstStyle/>
           <a:p>
             <a:r>
-              <a:rPr lang="fi-FI" i="1" dirty="0"/>
-              <a:t>Syventävää tietoa: </a:t>
-            </a:r>
-            <a:r>
-              <a:rPr lang="fi-FI" dirty="0" err="1" smtClean="0">
+              <a:rPr lang="fi-FI" dirty="0" err="1">
                 <a:solidFill>
                   <a:schemeClr val="accent2"/>
                 </a:solidFill>
@@ -10243,14 +9972,13 @@
               <a:t>Map</a:t>
             </a:r>
             <a:r>
-              <a:rPr lang="fi-FI" dirty="0" err="1" smtClean="0"/>
+              <a:rPr lang="fi-FI" dirty="0" err="1"/>
               <a:t>:in</a:t>
             </a:r>
             <a:r>
-              <a:rPr lang="fi-FI" dirty="0" smtClean="0"/>
+              <a:rPr lang="fi-FI" dirty="0"/>
               <a:t> koko sisällön läpikäynti</a:t>
             </a:r>
-            <a:endParaRPr lang="fi-FI" dirty="0"/>
           </a:p>
         </p:txBody>
       </p:sp>
@@ -10270,14 +9998,14 @@
           <a:lstStyle/>
           <a:p>
             <a:r>
-              <a:rPr lang="fi-FI" sz="2000" dirty="0" smtClean="0"/>
+              <a:rPr lang="fi-FI" sz="2000" dirty="0"/>
               <a:t>Mapin sisältö voidaan käydä helposti läpi joko avainten, arvojen tai avain-arvo –parien osalta</a:t>
             </a:r>
           </a:p>
           <a:p>
             <a:pPr lvl="1"/>
             <a:r>
-              <a:rPr lang="fi-FI" sz="1700" dirty="0" err="1" smtClean="0">
+              <a:rPr lang="fi-FI" sz="1700" dirty="0" err="1">
                 <a:solidFill>
                   <a:schemeClr val="accent2"/>
                 </a:solidFill>
@@ -10286,7 +10014,7 @@
               <a:t>keySet</a:t>
             </a:r>
             <a:r>
-              <a:rPr lang="fi-FI" sz="1700" dirty="0" smtClean="0">
+              <a:rPr lang="fi-FI" sz="1700" dirty="0">
                 <a:solidFill>
                   <a:schemeClr val="accent2"/>
                 </a:solidFill>
@@ -10295,7 +10023,7 @@
               <a:t>()</a:t>
             </a:r>
             <a:r>
-              <a:rPr lang="fi-FI" sz="1700" dirty="0" smtClean="0"/>
+              <a:rPr lang="fi-FI" sz="1700" dirty="0"/>
               <a:t> palauttaa kaikki mapin avaimet</a:t>
             </a:r>
           </a:p>
@@ -10320,7 +10048,7 @@
               <a:t>()</a:t>
             </a:r>
             <a:r>
-              <a:rPr lang="fi-FI" sz="1700" dirty="0" smtClean="0"/>
+              <a:rPr lang="fi-FI" sz="1700" dirty="0"/>
               <a:t> palauttaa kaikki mapin arvot</a:t>
             </a:r>
           </a:p>
@@ -10345,18 +10073,18 @@
               <a:t>()</a:t>
             </a:r>
             <a:r>
-              <a:rPr lang="fi-FI" sz="1700" dirty="0" smtClean="0"/>
+              <a:rPr lang="fi-FI" sz="1700" dirty="0"/>
               <a:t> palauttaa avaimet ja arvot pareina</a:t>
             </a:r>
           </a:p>
           <a:p>
             <a:pPr lvl="2"/>
             <a:r>
-              <a:rPr lang="fi-FI" sz="1400" dirty="0" smtClean="0"/>
+              <a:rPr lang="fi-FI" sz="1400" dirty="0"/>
               <a:t>Jokaisella </a:t>
             </a:r>
             <a:r>
-              <a:rPr lang="fi-FI" sz="1400" dirty="0" err="1" smtClean="0">
+              <a:rPr lang="fi-FI" sz="1400" dirty="0" err="1">
                 <a:solidFill>
                   <a:schemeClr val="accent2"/>
                 </a:solidFill>
@@ -10365,10 +10093,9 @@
               <a:t>Entry</a:t>
             </a:r>
             <a:r>
-              <a:rPr lang="fi-FI" sz="1400" dirty="0" smtClean="0"/>
+              <a:rPr lang="fi-FI" sz="1400" dirty="0"/>
               <a:t>-oliolla on yksi avain ja arvo</a:t>
             </a:r>
-            <a:endParaRPr lang="fi-FI" sz="1400" dirty="0"/>
           </a:p>
         </p:txBody>
       </p:sp>
@@ -11390,13 +11117,6 @@
   <p:clrMapOvr>
     <a:masterClrMapping/>
   </p:clrMapOvr>
-  <p:timing>
-    <p:tnLst>
-      <p:par>
-        <p:cTn id="1" dur="indefinite" restart="never" nodeType="tmRoot"/>
-      </p:par>
-    </p:tnLst>
-  </p:timing>
 </p:sld>
 </file>
 
@@ -11433,10 +11153,9 @@
           <a:lstStyle/>
           <a:p>
             <a:r>
-              <a:rPr lang="fi-FI" dirty="0" smtClean="0"/>
+              <a:rPr lang="fi-FI" dirty="0"/>
               <a:t>Javan kokoelmat</a:t>
             </a:r>
-            <a:endParaRPr lang="fi-FI" dirty="0"/>
           </a:p>
         </p:txBody>
       </p:sp>
@@ -11456,95 +11175,95 @@
           <a:lstStyle/>
           <a:p>
             <a:r>
-              <a:rPr lang="fi-FI" dirty="0" smtClean="0"/>
+              <a:rPr lang="fi-FI" dirty="0"/>
               <a:t>Olemme toistaiseksi käyttäneet listoja tai taulukoita, kun olemme halunneet käsitellä useita saman typpisiä asioita.</a:t>
             </a:r>
           </a:p>
           <a:p>
             <a:r>
-              <a:rPr lang="fi-FI" dirty="0" smtClean="0"/>
+              <a:rPr lang="fi-FI" dirty="0"/>
               <a:t>Javassa on myös muita </a:t>
             </a:r>
             <a:r>
-              <a:rPr lang="fi-FI" b="1" dirty="0" smtClean="0"/>
+              <a:rPr lang="fi-FI" b="1" dirty="0"/>
               <a:t>tietorakenteita </a:t>
             </a:r>
             <a:r>
-              <a:rPr lang="fi-FI" dirty="0" smtClean="0"/>
+              <a:rPr lang="fi-FI" dirty="0"/>
               <a:t>tiedon varastointiin ja käsittelyyn.</a:t>
             </a:r>
           </a:p>
           <a:p>
             <a:r>
-              <a:rPr lang="fi-FI" dirty="0" smtClean="0"/>
+              <a:rPr lang="fi-FI" dirty="0"/>
               <a:t>Java </a:t>
             </a:r>
             <a:r>
-              <a:rPr lang="fi-FI" dirty="0" err="1" smtClean="0"/>
+              <a:rPr lang="fi-FI" dirty="0" err="1"/>
               <a:t>Collections</a:t>
             </a:r>
             <a:r>
-              <a:rPr lang="fi-FI" dirty="0" smtClean="0"/>
+              <a:rPr lang="fi-FI" dirty="0"/>
               <a:t> Framework sisältää mm:</a:t>
             </a:r>
           </a:p>
           <a:p>
             <a:pPr lvl="1"/>
             <a:r>
-              <a:rPr lang="fi-FI" b="1" dirty="0" err="1" smtClean="0"/>
+              <a:rPr lang="fi-FI" b="1" dirty="0" err="1"/>
               <a:t>List</a:t>
             </a:r>
             <a:r>
-              <a:rPr lang="fi-FI" dirty="0" smtClean="0"/>
+              <a:rPr lang="fi-FI" dirty="0"/>
               <a:t>, esim. </a:t>
             </a:r>
             <a:r>
-              <a:rPr lang="fi-FI" dirty="0" err="1" smtClean="0"/>
+              <a:rPr lang="fi-FI" dirty="0" err="1"/>
               <a:t>ArrayList</a:t>
             </a:r>
-            <a:endParaRPr lang="fi-FI" dirty="0" smtClean="0"/>
+            <a:endParaRPr lang="fi-FI" dirty="0"/>
           </a:p>
           <a:p>
             <a:pPr lvl="1"/>
             <a:r>
-              <a:rPr lang="fi-FI" b="1" dirty="0" smtClean="0"/>
+              <a:rPr lang="fi-FI" b="1" dirty="0"/>
               <a:t>Set</a:t>
             </a:r>
           </a:p>
           <a:p>
             <a:pPr lvl="1"/>
             <a:r>
-              <a:rPr lang="fi-FI" b="1" dirty="0" err="1" smtClean="0"/>
+              <a:rPr lang="fi-FI" b="1" dirty="0" err="1"/>
               <a:t>Map</a:t>
             </a:r>
-            <a:endParaRPr lang="fi-FI" b="1" dirty="0" smtClean="0"/>
+            <a:endParaRPr lang="fi-FI" b="1" dirty="0"/>
           </a:p>
           <a:p>
             <a:pPr lvl="1"/>
             <a:r>
-              <a:rPr lang="fi-FI" dirty="0" smtClean="0"/>
+              <a:rPr lang="fi-FI" dirty="0"/>
               <a:t>Muuta: Queue, </a:t>
             </a:r>
             <a:r>
-              <a:rPr lang="fi-FI" dirty="0" err="1" smtClean="0"/>
+              <a:rPr lang="fi-FI" dirty="0" err="1"/>
               <a:t>Stack</a:t>
             </a:r>
             <a:r>
-              <a:rPr lang="fi-FI" dirty="0" smtClean="0"/>
+              <a:rPr lang="fi-FI" dirty="0"/>
               <a:t>, </a:t>
             </a:r>
             <a:r>
-              <a:rPr lang="fi-FI" dirty="0" err="1" smtClean="0"/>
+              <a:rPr lang="fi-FI" dirty="0" err="1"/>
               <a:t>ym</a:t>
             </a:r>
             <a:r>
-              <a:rPr lang="fi-FI" dirty="0" smtClean="0"/>
+              <a:rPr lang="fi-FI" dirty="0"/>
               <a:t> jota ei käsitellä</a:t>
             </a:r>
           </a:p>
           <a:p>
             <a:pPr lvl="1"/>
-            <a:endParaRPr lang="fi-FI" dirty="0" smtClean="0"/>
+            <a:endParaRPr lang="fi-FI" dirty="0"/>
           </a:p>
         </p:txBody>
       </p:sp>
@@ -11567,59 +11286,59 @@
               <a:buNone/>
             </a:pPr>
             <a:r>
-              <a:rPr lang="en-US" i="1" dirty="0" err="1" smtClean="0"/>
+              <a:rPr lang="en-US" i="1" dirty="0" err="1"/>
               <a:t>Kokoelma</a:t>
             </a:r>
             <a:r>
-              <a:rPr lang="en-US" i="1" dirty="0" smtClean="0"/>
+              <a:rPr lang="en-US" i="1" dirty="0"/>
               <a:t> on </a:t>
             </a:r>
             <a:r>
-              <a:rPr lang="en-US" i="1" dirty="0" err="1" smtClean="0"/>
+              <a:rPr lang="en-US" i="1" dirty="0" err="1"/>
               <a:t>yksinkertaisesti</a:t>
             </a:r>
             <a:r>
-              <a:rPr lang="en-US" i="1" dirty="0" smtClean="0"/>
+              <a:rPr lang="en-US" i="1" dirty="0"/>
               <a:t> olio, </a:t>
             </a:r>
             <a:r>
-              <a:rPr lang="en-US" i="1" dirty="0" err="1" smtClean="0"/>
+              <a:rPr lang="en-US" i="1" dirty="0" err="1"/>
               <a:t>joka</a:t>
             </a:r>
             <a:r>
-              <a:rPr lang="en-US" i="1" dirty="0" smtClean="0"/>
+              <a:rPr lang="en-US" i="1" dirty="0"/>
               <a:t> </a:t>
             </a:r>
             <a:r>
-              <a:rPr lang="en-US" i="1" dirty="0" err="1" smtClean="0"/>
+              <a:rPr lang="en-US" i="1" dirty="0" err="1"/>
               <a:t>kokoaa</a:t>
             </a:r>
             <a:r>
-              <a:rPr lang="en-US" i="1" dirty="0" smtClean="0"/>
+              <a:rPr lang="en-US" i="1" dirty="0"/>
               <a:t> </a:t>
             </a:r>
             <a:r>
-              <a:rPr lang="en-US" i="1" dirty="0" err="1" smtClean="0"/>
+              <a:rPr lang="en-US" i="1" dirty="0" err="1"/>
               <a:t>alkioita</a:t>
             </a:r>
             <a:r>
-              <a:rPr lang="en-US" i="1" dirty="0" smtClean="0"/>
+              <a:rPr lang="en-US" i="1" dirty="0"/>
               <a:t> </a:t>
             </a:r>
             <a:r>
-              <a:rPr lang="en-US" i="1" dirty="0" err="1" smtClean="0"/>
+              <a:rPr lang="en-US" i="1" dirty="0" err="1"/>
               <a:t>yhteen</a:t>
             </a:r>
             <a:r>
-              <a:rPr lang="en-US" i="1" dirty="0" smtClean="0"/>
+              <a:rPr lang="en-US" i="1" dirty="0"/>
               <a:t>. </a:t>
             </a:r>
             <a:r>
-              <a:rPr lang="en-US" i="1" baseline="30000" dirty="0" smtClean="0"/>
+              <a:rPr lang="en-US" i="1" baseline="30000" dirty="0"/>
               <a:t>1</a:t>
             </a:r>
             <a:r>
-              <a:rPr lang="en-US" i="1" dirty="0" smtClean="0"/>
+              <a:rPr lang="en-US" i="1" dirty="0"/>
               <a:t>   </a:t>
             </a:r>
           </a:p>
@@ -11639,7 +11358,7 @@
             <a:pPr marL="0" indent="0">
               <a:buNone/>
             </a:pPr>
-            <a:endParaRPr lang="en-US" dirty="0" smtClean="0"/>
+            <a:endParaRPr lang="en-US" dirty="0"/>
           </a:p>
           <a:p>
             <a:pPr marL="0" indent="0">
@@ -11651,7 +11370,7 @@
             <a:pPr marL="0" indent="0">
               <a:buNone/>
             </a:pPr>
-            <a:endParaRPr lang="en-US" dirty="0" smtClean="0"/>
+            <a:endParaRPr lang="en-US" dirty="0"/>
           </a:p>
           <a:p>
             <a:pPr marL="0" indent="0">
@@ -11664,36 +11383,20 @@
               <a:buNone/>
             </a:pPr>
             <a:r>
-              <a:rPr lang="en-US" sz="1200" baseline="30000" dirty="0" smtClean="0"/>
+              <a:rPr lang="en-US" sz="1200" baseline="30000" dirty="0"/>
               <a:t>1</a:t>
             </a:r>
             <a:r>
-              <a:rPr lang="en-US" sz="1200" dirty="0" smtClean="0"/>
+              <a:rPr lang="en-US" sz="1200" dirty="0"/>
               <a:t> </a:t>
             </a:r>
             <a:r>
-              <a:rPr lang="en-US" sz="1200" i="1" dirty="0" smtClean="0"/>
-              <a:t>"A</a:t>
-            </a:r>
-            <a:r>
               <a:rPr lang="en-US" sz="1200" i="1" dirty="0"/>
-              <a:t> collection — sometimes called a container — is simply an object </a:t>
-            </a:r>
-            <a:r>
-              <a:rPr lang="en-US" sz="1200" i="1" dirty="0" smtClean="0"/>
-              <a:t>that groups </a:t>
-            </a:r>
-            <a:r>
-              <a:rPr lang="en-US" sz="1200" i="1" dirty="0"/>
-              <a:t>multiple elements into a single unit" </a:t>
-            </a:r>
-            <a:r>
-              <a:rPr lang="en-US" sz="1200" dirty="0" smtClean="0"/>
-              <a:t>https</a:t>
+              <a:t>"A collection — sometimes called a container — is simply an object that groups multiple elements into a single unit" </a:t>
             </a:r>
             <a:r>
               <a:rPr lang="en-US" sz="1200" dirty="0"/>
-              <a:t>://docs.oracle.com/javase/tutorial/collections/intro/index.html</a:t>
+              <a:t>https://docs.oracle.com/javase/tutorial/collections/intro/index.html</a:t>
             </a:r>
             <a:endParaRPr lang="fi-FI" sz="1800" dirty="0"/>
           </a:p>
@@ -11712,13 +11415,6 @@
   <p:clrMapOvr>
     <a:masterClrMapping/>
   </p:clrMapOvr>
-  <p:timing>
-    <p:tnLst>
-      <p:par>
-        <p:cTn id="1" dur="indefinite" restart="never" nodeType="tmRoot"/>
-      </p:par>
-    </p:tnLst>
-  </p:timing>
 </p:sld>
 </file>
 
@@ -11756,7 +11452,7 @@
           <a:p>
             <a:pPr algn="ctr"/>
             <a:r>
-              <a:rPr lang="fi-FI" dirty="0" err="1" smtClean="0">
+              <a:rPr lang="fi-FI" dirty="0" err="1">
                 <a:solidFill>
                   <a:schemeClr val="accent2"/>
                 </a:solidFill>
@@ -11765,7 +11461,7 @@
               <a:t>Map</a:t>
             </a:r>
             <a:r>
-              <a:rPr lang="fi-FI" dirty="0" smtClean="0">
+              <a:rPr lang="fi-FI" dirty="0">
                 <a:solidFill>
                   <a:schemeClr val="accent2"/>
                 </a:solidFill>
@@ -11796,10 +11492,9 @@
           <a:lstStyle/>
           <a:p>
             <a:r>
-              <a:rPr lang="fi-FI" dirty="0" smtClean="0"/>
+              <a:rPr lang="fi-FI" dirty="0"/>
               <a:t>Datan tallentaminen avainten ja arvojen pareina</a:t>
             </a:r>
-            <a:endParaRPr lang="fi-FI" dirty="0"/>
           </a:p>
         </p:txBody>
       </p:sp>
@@ -11813,13 +11508,6 @@
   <p:clrMapOvr>
     <a:masterClrMapping/>
   </p:clrMapOvr>
-  <p:timing>
-    <p:tnLst>
-      <p:par>
-        <p:cTn id="1" dur="indefinite" restart="never" nodeType="tmRoot"/>
-      </p:par>
-    </p:tnLst>
-  </p:timing>
 </p:sld>
 </file>
 
@@ -11861,10 +11549,9 @@
           <a:lstStyle/>
           <a:p>
             <a:r>
-              <a:rPr lang="fi-FI" dirty="0" smtClean="0"/>
+              <a:rPr lang="fi-FI" dirty="0"/>
               <a:t>Analogia: JSON-tiedostomuoto</a:t>
             </a:r>
-            <a:endParaRPr lang="fi-FI" dirty="0"/>
           </a:p>
         </p:txBody>
       </p:sp>
@@ -12004,7 +11691,7 @@
               <a:t>email</a:t>
             </a:r>
             <a:r>
-              <a:rPr lang="fi-FI" sz="1400" dirty="0" smtClean="0">
+              <a:rPr lang="fi-FI" sz="1400" dirty="0">
                 <a:solidFill>
                   <a:srgbClr val="008000"/>
                 </a:solidFill>
@@ -12012,12 +11699,6 @@
               </a:rPr>
               <a:t>": "ldrillingcourt0@so-net.ne.jp",</a:t>
             </a:r>
-            <a:endParaRPr lang="fi-FI" sz="1400" dirty="0">
-              <a:solidFill>
-                <a:srgbClr val="008000"/>
-              </a:solidFill>
-              <a:latin typeface="Consolas" panose="020B0609020204030204" pitchFamily="49" charset="0"/>
-            </a:endParaRPr>
           </a:p>
           <a:p>
             <a:pPr marL="0" indent="0">
@@ -12267,7 +11948,7 @@
               <a:t>": </a:t>
             </a:r>
             <a:r>
-              <a:rPr lang="fi-FI" sz="1400" dirty="0" err="1" smtClean="0">
+              <a:rPr lang="fi-FI" sz="1400" dirty="0" err="1">
                 <a:solidFill>
                   <a:schemeClr val="tx1"/>
                 </a:solidFill>
@@ -12276,7 +11957,7 @@
               <a:t>null</a:t>
             </a:r>
             <a:r>
-              <a:rPr lang="fi-FI" sz="1400" dirty="0" smtClean="0">
+              <a:rPr lang="fi-FI" sz="1400" dirty="0">
                 <a:solidFill>
                   <a:srgbClr val="008000"/>
                 </a:solidFill>
@@ -12284,12 +11965,6 @@
               </a:rPr>
               <a:t>,</a:t>
             </a:r>
-            <a:endParaRPr lang="fi-FI" sz="1400" dirty="0">
-              <a:solidFill>
-                <a:srgbClr val="008000"/>
-              </a:solidFill>
-              <a:latin typeface="Consolas" panose="020B0609020204030204" pitchFamily="49" charset="0"/>
-            </a:endParaRPr>
           </a:p>
           <a:p>
             <a:pPr marL="0" indent="0">
@@ -12412,25 +12087,7 @@
                 </a:solidFill>
                 <a:latin typeface="Consolas" panose="020B0609020204030204" pitchFamily="49" charset="0"/>
               </a:rPr>
-              <a:t>": </a:t>
-            </a:r>
-            <a:r>
-              <a:rPr lang="fi-FI" sz="1400" dirty="0" smtClean="0">
-                <a:solidFill>
-                  <a:srgbClr val="008000"/>
-                </a:solidFill>
-                <a:latin typeface="Consolas" panose="020B0609020204030204" pitchFamily="49" charset="0"/>
-              </a:rPr>
-              <a:t>"cyberchimps.com</a:t>
-            </a:r>
-            <a:r>
-              <a:rPr lang="fi-FI" sz="1400" dirty="0">
-                <a:solidFill>
-                  <a:srgbClr val="008000"/>
-                </a:solidFill>
-                <a:latin typeface="Consolas" panose="020B0609020204030204" pitchFamily="49" charset="0"/>
-              </a:rPr>
-              <a:t>",</a:t>
+              <a:t>": "cyberchimps.com",</a:t>
             </a:r>
           </a:p>
           <a:p>
@@ -12485,12 +12142,8 @@
           <a:lstStyle/>
           <a:p>
             <a:r>
-              <a:rPr lang="fi-FI" sz="1200" dirty="0" smtClean="0"/>
-              <a:t>JSON esimerkki: https</a:t>
-            </a:r>
-            <a:r>
               <a:rPr lang="fi-FI" sz="1200" dirty="0"/>
-              <a:t>://mockaroo.com/</a:t>
+              <a:t>JSON esimerkki: https://mockaroo.com/</a:t>
             </a:r>
           </a:p>
         </p:txBody>
@@ -12505,13 +12158,6 @@
   <p:clrMapOvr>
     <a:masterClrMapping/>
   </p:clrMapOvr>
-  <p:timing>
-    <p:tnLst>
-      <p:par>
-        <p:cTn id="1" dur="indefinite" restart="never" nodeType="tmRoot"/>
-      </p:par>
-    </p:tnLst>
-  </p:timing>
 </p:sld>
 </file>
 
@@ -12589,7 +12235,7 @@
           <a:lstStyle/>
           <a:p>
             <a:r>
-              <a:rPr lang="fi-FI" dirty="0" err="1" smtClean="0">
+              <a:rPr lang="fi-FI" dirty="0" err="1">
                 <a:solidFill>
                   <a:schemeClr val="accent2"/>
                 </a:solidFill>
@@ -12598,10 +12244,9 @@
               <a:t>Map</a:t>
             </a:r>
             <a:r>
-              <a:rPr lang="fi-FI" dirty="0" smtClean="0"/>
+              <a:rPr lang="fi-FI" dirty="0"/>
               <a:t>-tietorakenteet</a:t>
             </a:r>
-            <a:endParaRPr lang="fi-FI" dirty="0"/>
           </a:p>
         </p:txBody>
       </p:sp>
@@ -12621,7 +12266,7 @@
           <a:lstStyle/>
           <a:p>
             <a:r>
-              <a:rPr lang="fi-FI" dirty="0" err="1" smtClean="0">
+              <a:rPr lang="fi-FI" dirty="0" err="1">
                 <a:solidFill>
                   <a:schemeClr val="accent2"/>
                 </a:solidFill>
@@ -12630,13 +12275,13 @@
               <a:t>Map</a:t>
             </a:r>
             <a:r>
-              <a:rPr lang="fi-FI" dirty="0" smtClean="0"/>
+              <a:rPr lang="fi-FI" dirty="0"/>
               <a:t> on eräs ohjelmoinnissa paljon käytetyistä tietorakenteista. </a:t>
             </a:r>
           </a:p>
           <a:p>
             <a:r>
-              <a:rPr lang="fi-FI" dirty="0" err="1" smtClean="0">
+              <a:rPr lang="fi-FI" dirty="0" err="1">
                 <a:solidFill>
                   <a:schemeClr val="accent2"/>
                 </a:solidFill>
@@ -12645,15 +12290,15 @@
               <a:t>Map</a:t>
             </a:r>
             <a:r>
-              <a:rPr lang="fi-FI" dirty="0" err="1" smtClean="0"/>
+              <a:rPr lang="fi-FI" dirty="0" err="1"/>
               <a:t>:ia</a:t>
             </a:r>
             <a:r>
-              <a:rPr lang="fi-FI" dirty="0" smtClean="0"/>
+              <a:rPr lang="fi-FI" dirty="0"/>
               <a:t> käytetään kun halutaan käsitellä tietoa avain-arvo –pareina. Avaimen perusteella voidaan </a:t>
             </a:r>
             <a:r>
-              <a:rPr lang="fi-FI" dirty="0" smtClean="0">
+              <a:rPr lang="fi-FI" dirty="0">
                 <a:solidFill>
                   <a:srgbClr val="00B050"/>
                 </a:solidFill>
@@ -12661,11 +12306,11 @@
               <a:t>lisätä</a:t>
             </a:r>
             <a:r>
-              <a:rPr lang="fi-FI" dirty="0" smtClean="0"/>
+              <a:rPr lang="fi-FI" dirty="0"/>
               <a:t>, </a:t>
             </a:r>
             <a:r>
-              <a:rPr lang="fi-FI" dirty="0" smtClean="0">
+              <a:rPr lang="fi-FI" dirty="0">
                 <a:solidFill>
                   <a:srgbClr val="00B050"/>
                 </a:solidFill>
@@ -12673,11 +12318,11 @@
               <a:t>hakea</a:t>
             </a:r>
             <a:r>
-              <a:rPr lang="fi-FI" dirty="0" smtClean="0"/>
+              <a:rPr lang="fi-FI" dirty="0"/>
               <a:t> ja </a:t>
             </a:r>
             <a:r>
-              <a:rPr lang="fi-FI" dirty="0" smtClean="0">
+              <a:rPr lang="fi-FI" dirty="0">
                 <a:solidFill>
                   <a:srgbClr val="00B050"/>
                 </a:solidFill>
@@ -12685,21 +12330,21 @@
               <a:t>poistaa</a:t>
             </a:r>
             <a:r>
-              <a:rPr lang="fi-FI" dirty="0" smtClean="0"/>
+              <a:rPr lang="fi-FI" dirty="0"/>
               <a:t> </a:t>
             </a:r>
             <a:r>
-              <a:rPr lang="fi-FI" u="sng" dirty="0" smtClean="0"/>
+              <a:rPr lang="fi-FI" u="sng" dirty="0"/>
               <a:t>avaimeen liittyvä arvo</a:t>
             </a:r>
             <a:r>
-              <a:rPr lang="fi-FI" dirty="0" smtClean="0"/>
+              <a:rPr lang="fi-FI" dirty="0"/>
               <a:t>.</a:t>
             </a:r>
           </a:p>
           <a:p>
             <a:r>
-              <a:rPr lang="fi-FI" dirty="0" smtClean="0"/>
+              <a:rPr lang="fi-FI" dirty="0"/>
               <a:t>Siis toisin kuin listoissa, arvoja ei käsitellä numeeristen indeksien avulla, vaan voimme määritellä avaimiksi esimerkiksi merkkijonoja.</a:t>
             </a:r>
             <a:endParaRPr lang="fi-FI" sz="2000" dirty="0"/>
@@ -12780,7 +12425,7 @@
             <a:pPr marL="0" indent="0">
               <a:buNone/>
             </a:pPr>
-            <a:endParaRPr lang="en-US" sz="1600" dirty="0" smtClean="0">
+            <a:endParaRPr lang="en-US" sz="1600" dirty="0">
               <a:solidFill>
                 <a:srgbClr val="000000"/>
               </a:solidFill>
@@ -12792,7 +12437,7 @@
               <a:buNone/>
             </a:pPr>
             <a:r>
-              <a:rPr lang="en-US" sz="1600" dirty="0" smtClean="0">
+              <a:rPr lang="en-US" sz="1600" dirty="0">
                 <a:solidFill>
                   <a:srgbClr val="000000"/>
                 </a:solidFill>
@@ -12817,7 +12462,7 @@
               <a:buNone/>
             </a:pPr>
             <a:r>
-              <a:rPr lang="en-US" sz="1600" dirty="0" err="1" smtClean="0">
+              <a:rPr lang="en-US" sz="1600" dirty="0" err="1">
                 <a:solidFill>
                   <a:srgbClr val="000000"/>
                 </a:solidFill>
@@ -12826,22 +12471,13 @@
               <a:t>HashMap</a:t>
             </a:r>
             <a:r>
-              <a:rPr lang="en-US" sz="1600" dirty="0" smtClean="0">
-                <a:solidFill>
-                  <a:srgbClr val="000000"/>
-                </a:solidFill>
-                <a:latin typeface="Consolas" panose="020B0609020204030204" pitchFamily="49" charset="0"/>
-              </a:rPr>
-              <a:t>&lt;String</a:t>
-            </a:r>
-            <a:r>
               <a:rPr lang="en-US" sz="1600" dirty="0">
                 <a:solidFill>
                   <a:srgbClr val="000000"/>
                 </a:solidFill>
                 <a:latin typeface="Consolas" panose="020B0609020204030204" pitchFamily="49" charset="0"/>
               </a:rPr>
-              <a:t>, String&gt; </a:t>
+              <a:t>&lt;String, String&gt; </a:t>
             </a:r>
             <a:r>
               <a:rPr lang="en-US" sz="1600" dirty="0" err="1">
@@ -12859,69 +12495,51 @@
                 </a:solidFill>
                 <a:latin typeface="Consolas" panose="020B0609020204030204" pitchFamily="49" charset="0"/>
               </a:rPr>
+              <a:t> =</a:t>
+            </a:r>
+          </a:p>
+          <a:p>
+            <a:pPr marL="0" indent="0">
+              <a:buNone/>
+            </a:pPr>
+            <a:r>
+              <a:rPr lang="en-US" sz="1600" dirty="0">
+                <a:solidFill>
+                  <a:srgbClr val="000000"/>
+                </a:solidFill>
+                <a:latin typeface="Consolas" panose="020B0609020204030204" pitchFamily="49" charset="0"/>
+              </a:rPr>
+              <a:t>        </a:t>
+            </a:r>
+            <a:r>
+              <a:rPr lang="en-US" sz="1600" dirty="0">
+                <a:solidFill>
+                  <a:srgbClr val="7F0055"/>
+                </a:solidFill>
+                <a:latin typeface="Consolas" panose="020B0609020204030204" pitchFamily="49" charset="0"/>
+              </a:rPr>
+              <a:t>new</a:t>
+            </a:r>
+            <a:r>
+              <a:rPr lang="en-US" sz="1600" dirty="0">
+                <a:solidFill>
+                  <a:srgbClr val="000000"/>
+                </a:solidFill>
+                <a:latin typeface="Consolas" panose="020B0609020204030204" pitchFamily="49" charset="0"/>
+              </a:rPr>
               <a:t> </a:t>
             </a:r>
             <a:r>
-              <a:rPr lang="en-US" sz="1600" dirty="0" smtClean="0">
-                <a:solidFill>
-                  <a:srgbClr val="000000"/>
-                </a:solidFill>
-                <a:latin typeface="Consolas" panose="020B0609020204030204" pitchFamily="49" charset="0"/>
-              </a:rPr>
-              <a:t>=</a:t>
-            </a:r>
-          </a:p>
-          <a:p>
-            <a:pPr marL="0" indent="0">
-              <a:buNone/>
-            </a:pPr>
+              <a:rPr lang="en-US" sz="1600" dirty="0" err="1">
+                <a:solidFill>
+                  <a:srgbClr val="000000"/>
+                </a:solidFill>
+                <a:latin typeface="Consolas" panose="020B0609020204030204" pitchFamily="49" charset="0"/>
+              </a:rPr>
+              <a:t>HashMap</a:t>
+            </a:r>
             <a:r>
               <a:rPr lang="en-US" sz="1600" dirty="0">
-                <a:solidFill>
-                  <a:srgbClr val="000000"/>
-                </a:solidFill>
-                <a:latin typeface="Consolas" panose="020B0609020204030204" pitchFamily="49" charset="0"/>
-              </a:rPr>
-              <a:t> </a:t>
-            </a:r>
-            <a:r>
-              <a:rPr lang="en-US" sz="1600" dirty="0" smtClean="0">
-                <a:solidFill>
-                  <a:srgbClr val="000000"/>
-                </a:solidFill>
-                <a:latin typeface="Consolas" panose="020B0609020204030204" pitchFamily="49" charset="0"/>
-              </a:rPr>
-              <a:t>       </a:t>
-            </a:r>
-            <a:r>
-              <a:rPr lang="en-US" sz="1600" dirty="0" smtClean="0">
-                <a:solidFill>
-                  <a:srgbClr val="7F0055"/>
-                </a:solidFill>
-                <a:latin typeface="Consolas" panose="020B0609020204030204" pitchFamily="49" charset="0"/>
-              </a:rPr>
-              <a:t>new</a:t>
-            </a:r>
-            <a:r>
-              <a:rPr lang="en-US" sz="1600" dirty="0" smtClean="0">
-                <a:solidFill>
-                  <a:srgbClr val="000000"/>
-                </a:solidFill>
-                <a:latin typeface="Consolas" panose="020B0609020204030204" pitchFamily="49" charset="0"/>
-              </a:rPr>
-              <a:t> </a:t>
-            </a:r>
-            <a:r>
-              <a:rPr lang="en-US" sz="1600" dirty="0" err="1" smtClean="0">
-                <a:solidFill>
-                  <a:srgbClr val="000000"/>
-                </a:solidFill>
-                <a:latin typeface="Consolas" panose="020B0609020204030204" pitchFamily="49" charset="0"/>
-              </a:rPr>
-              <a:t>HashMap</a:t>
-            </a:r>
-            <a:r>
-              <a:rPr lang="en-US" sz="1600" dirty="0" smtClean="0">
                 <a:solidFill>
                   <a:srgbClr val="000000"/>
                 </a:solidFill>
@@ -13270,7 +12888,7 @@
               <a:buNone/>
               <a:tabLst/>
             </a:pPr>
-            <a:endParaRPr kumimoji="0" lang="fi-FI" sz="2400" b="0" i="0" u="none" strike="noStrike" cap="none" normalizeH="0" baseline="0" smtClean="0">
+            <a:endParaRPr kumimoji="0" lang="fi-FI" sz="2400" b="0" i="0" u="none" strike="noStrike" cap="none" normalizeH="0" baseline="0">
               <a:ln>
                 <a:noFill/>
               </a:ln>
@@ -13332,15 +12950,7 @@
             </a:r>
             <a:r>
               <a:rPr lang="fi-FI" sz="1200" dirty="0"/>
-              <a:t> </a:t>
-            </a:r>
-            <a:r>
-              <a:rPr lang="fi-FI" sz="1200" dirty="0" smtClean="0"/>
-              <a:t>–tutkimusryhmän oppimateriaalista, joka </a:t>
-            </a:r>
-            <a:r>
-              <a:rPr lang="fi-FI" sz="1200" dirty="0"/>
-              <a:t>on lisensoitu Creative </a:t>
+              <a:t> –tutkimusryhmän oppimateriaalista, joka on lisensoitu Creative </a:t>
             </a:r>
             <a:r>
               <a:rPr lang="fi-FI" sz="1200" dirty="0" err="1"/>
@@ -13348,23 +12958,18 @@
             </a:r>
             <a:r>
               <a:rPr lang="fi-FI" sz="1200" dirty="0"/>
+              <a:t> BY-NC-SA-lisenssillä. </a:t>
+            </a:r>
+            <a:r>
+              <a:rPr lang="fi-FI" sz="1200" dirty="0">
+                <a:hlinkClick r:id="rId3"/>
+              </a:rPr>
+              <a:t>https://2017-ohjelmointi.github.io/part8/</a:t>
+            </a:r>
+            <a:r>
+              <a:rPr lang="fi-FI" sz="1200" dirty="0"/>
               <a:t> </a:t>
             </a:r>
-            <a:r>
-              <a:rPr lang="fi-FI" sz="1200" dirty="0" smtClean="0"/>
-              <a:t>BY-NC-SA-lisenssillä. </a:t>
-            </a:r>
-            <a:r>
-              <a:rPr lang="fi-FI" sz="1200" dirty="0" smtClean="0">
-                <a:hlinkClick r:id="rId3"/>
-              </a:rPr>
-              <a:t>https://2017-ohjelmointi.github.io/part8/</a:t>
-            </a:r>
-            <a:r>
-              <a:rPr lang="fi-FI" sz="1200" dirty="0" smtClean="0"/>
-              <a:t> </a:t>
-            </a:r>
-            <a:endParaRPr lang="fi-FI" sz="1200" dirty="0"/>
           </a:p>
         </p:txBody>
       </p:sp>
@@ -13500,7 +13105,7 @@
           <a:lstStyle/>
           <a:p>
             <a:r>
-              <a:rPr lang="fi-FI" dirty="0" smtClean="0">
+              <a:rPr lang="fi-FI" dirty="0">
                 <a:solidFill>
                   <a:schemeClr val="accent2"/>
                 </a:solidFill>
@@ -13509,10 +13114,9 @@
               <a:t>Map</a:t>
             </a:r>
             <a:r>
-              <a:rPr lang="fi-FI" dirty="0" smtClean="0"/>
+              <a:rPr lang="fi-FI" dirty="0"/>
               <a:t>in tyypin määrittely</a:t>
             </a:r>
-            <a:endParaRPr lang="fi-FI" dirty="0"/>
           </a:p>
         </p:txBody>
       </p:sp>
@@ -13533,57 +13137,36 @@
           <a:p>
             <a:r>
               <a:rPr lang="fi-FI" dirty="0"/>
-              <a:t>Hajautustaulua luodessa tarvitaan kaksi </a:t>
-            </a:r>
-            <a:r>
-              <a:rPr lang="fi-FI" dirty="0" smtClean="0"/>
-              <a:t>tyyppiparametria:</a:t>
+              <a:t>Hajautustaulua luodessa tarvitaan kaksi tyyppiparametria:</a:t>
             </a:r>
           </a:p>
           <a:p>
             <a:pPr lvl="1"/>
             <a:r>
-              <a:rPr lang="fi-FI" dirty="0" smtClean="0"/>
-              <a:t>avainmuuttujan </a:t>
-            </a:r>
-            <a:r>
               <a:rPr lang="fi-FI" dirty="0"/>
-              <a:t>tyyppi ja </a:t>
-            </a:r>
-            <a:endParaRPr lang="fi-FI" dirty="0" smtClean="0"/>
+              <a:t>avainmuuttujan tyyppi ja </a:t>
+            </a:r>
           </a:p>
           <a:p>
             <a:pPr lvl="1"/>
             <a:r>
-              <a:rPr lang="fi-FI" dirty="0" smtClean="0"/>
-              <a:t>lisättävän </a:t>
-            </a:r>
-            <a:r>
               <a:rPr lang="fi-FI" dirty="0"/>
-              <a:t>arvon </a:t>
-            </a:r>
-            <a:r>
-              <a:rPr lang="fi-FI" dirty="0" smtClean="0"/>
-              <a:t>tyyppi.</a:t>
-            </a:r>
-          </a:p>
-          <a:p>
-            <a:r>
-              <a:rPr lang="fi-FI" dirty="0" smtClean="0"/>
+              <a:t>lisättävän arvon tyyppi.</a:t>
+            </a:r>
+          </a:p>
+          <a:p>
+            <a:r>
+              <a:rPr lang="fi-FI" dirty="0"/>
               <a:t>Tyyppiparametrit määritellään kulmasulkeisiin pilkulla eroteltuna</a:t>
             </a:r>
           </a:p>
           <a:p>
             <a:r>
-              <a:rPr lang="fi-FI" dirty="0" smtClean="0"/>
-              <a:t>Viereisessä esimerkissä </a:t>
-            </a:r>
-            <a:r>
               <a:rPr lang="fi-FI" dirty="0"/>
-              <a:t>sekä avainmuuttujan että lisättävän arvon tyyppi on </a:t>
-            </a:r>
-            <a:r>
-              <a:rPr lang="fi-FI" dirty="0" err="1" smtClean="0">
+              <a:t>Viereisessä esimerkissä sekä avainmuuttujan että lisättävän arvon tyyppi on </a:t>
+            </a:r>
+            <a:r>
+              <a:rPr lang="fi-FI" dirty="0" err="1">
                 <a:solidFill>
                   <a:schemeClr val="accent2"/>
                 </a:solidFill>
@@ -13632,7 +13215,7 @@
               <a:buNone/>
             </a:pPr>
             <a:r>
-              <a:rPr lang="fi-FI" sz="1600" dirty="0" err="1" smtClean="0">
+              <a:rPr lang="fi-FI" sz="1600" dirty="0" err="1">
                 <a:solidFill>
                   <a:srgbClr val="000000"/>
                 </a:solidFill>
@@ -13641,7 +13224,7 @@
               <a:t>Map</a:t>
             </a:r>
             <a:r>
-              <a:rPr lang="fi-FI" sz="1600" dirty="0" smtClean="0">
+              <a:rPr lang="fi-FI" sz="1600" dirty="0">
                 <a:solidFill>
                   <a:srgbClr val="000000"/>
                 </a:solidFill>
@@ -13650,7 +13233,7 @@
               <a:t>&lt;</a:t>
             </a:r>
             <a:r>
-              <a:rPr lang="fi-FI" sz="1600" dirty="0" err="1" smtClean="0">
+              <a:rPr lang="fi-FI" sz="1600" dirty="0" err="1">
                 <a:solidFill>
                   <a:srgbClr val="000000"/>
                 </a:solidFill>
@@ -13703,12 +13286,6 @@
               </a:rPr>
               <a:t> = </a:t>
             </a:r>
-            <a:endParaRPr lang="fi-FI" sz="1600" dirty="0" smtClean="0">
-              <a:solidFill>
-                <a:srgbClr val="000000"/>
-              </a:solidFill>
-              <a:latin typeface="Consolas" panose="020B0609020204030204" pitchFamily="49" charset="0"/>
-            </a:endParaRPr>
           </a:p>
           <a:p>
             <a:pPr marL="0" indent="0">
@@ -13721,19 +13298,10 @@
                 </a:solidFill>
                 <a:latin typeface="Consolas" panose="020B0609020204030204" pitchFamily="49" charset="0"/>
               </a:rPr>
-              <a:t> </a:t>
-            </a:r>
-            <a:r>
-              <a:rPr lang="fi-FI" sz="1600" dirty="0" smtClean="0">
-                <a:solidFill>
-                  <a:srgbClr val="000000"/>
-                </a:solidFill>
-                <a:latin typeface="Consolas" panose="020B0609020204030204" pitchFamily="49" charset="0"/>
-              </a:rPr>
-              <a:t>       </a:t>
-            </a:r>
-            <a:r>
-              <a:rPr lang="fi-FI" sz="1600" dirty="0" err="1" smtClean="0">
+              <a:t>        </a:t>
+            </a:r>
+            <a:r>
+              <a:rPr lang="fi-FI" sz="1600" dirty="0" err="1">
                 <a:solidFill>
                   <a:srgbClr val="7F0055"/>
                 </a:solidFill>
@@ -13742,7 +13310,7 @@
               <a:t>new</a:t>
             </a:r>
             <a:r>
-              <a:rPr lang="fi-FI" sz="1600" dirty="0" smtClean="0">
+              <a:rPr lang="fi-FI" sz="1600" dirty="0">
                 <a:solidFill>
                   <a:srgbClr val="000000"/>
                 </a:solidFill>
@@ -13963,19 +13531,10 @@
                 </a:solidFill>
                 <a:latin typeface="Consolas" panose="020B0609020204030204" pitchFamily="49" charset="0"/>
               </a:rPr>
-              <a:t>"avain</a:t>
-            </a:r>
-            <a:r>
-              <a:rPr lang="fi-FI" sz="1600" dirty="0" smtClean="0">
-                <a:solidFill>
-                  <a:srgbClr val="2A00FF"/>
-                </a:solidFill>
-                <a:latin typeface="Consolas" panose="020B0609020204030204" pitchFamily="49" charset="0"/>
-              </a:rPr>
-              <a:t>"</a:t>
-            </a:r>
-            <a:r>
-              <a:rPr lang="fi-FI" sz="1600" dirty="0" smtClean="0">
+              <a:t>"avain"</a:t>
+            </a:r>
+            <a:r>
+              <a:rPr lang="fi-FI" sz="1600" dirty="0">
                 <a:solidFill>
                   <a:srgbClr val="000000"/>
                 </a:solidFill>
@@ -14104,15 +13663,7 @@
             </a:r>
             <a:r>
               <a:rPr lang="fi-FI" sz="1200" dirty="0"/>
-              <a:t> </a:t>
-            </a:r>
-            <a:r>
-              <a:rPr lang="fi-FI" sz="1200" dirty="0" smtClean="0"/>
-              <a:t>–tutkimusryhmän oppimateriaalista, joka </a:t>
-            </a:r>
-            <a:r>
-              <a:rPr lang="fi-FI" sz="1200" dirty="0"/>
-              <a:t>on lisensoitu Creative </a:t>
+              <a:t> –tutkimusryhmän oppimateriaalista, joka on lisensoitu Creative </a:t>
             </a:r>
             <a:r>
               <a:rPr lang="fi-FI" sz="1200" dirty="0" err="1"/>
@@ -14120,23 +13671,18 @@
             </a:r>
             <a:r>
               <a:rPr lang="fi-FI" sz="1200" dirty="0"/>
+              <a:t> BY-NC-SA-lisenssillä. </a:t>
+            </a:r>
+            <a:r>
+              <a:rPr lang="fi-FI" sz="1200" dirty="0">
+                <a:hlinkClick r:id="rId2"/>
+              </a:rPr>
+              <a:t>https://2017-ohjelmointi.github.io/part8/</a:t>
+            </a:r>
+            <a:r>
+              <a:rPr lang="fi-FI" sz="1200" dirty="0"/>
               <a:t> </a:t>
             </a:r>
-            <a:r>
-              <a:rPr lang="fi-FI" sz="1200" dirty="0" smtClean="0"/>
-              <a:t>BY-NC-SA-lisenssillä. </a:t>
-            </a:r>
-            <a:r>
-              <a:rPr lang="fi-FI" sz="1200" dirty="0" smtClean="0">
-                <a:hlinkClick r:id="rId2"/>
-              </a:rPr>
-              <a:t>https://2017-ohjelmointi.github.io/part8/</a:t>
-            </a:r>
-            <a:r>
-              <a:rPr lang="fi-FI" sz="1200" dirty="0" smtClean="0"/>
-              <a:t> </a:t>
-            </a:r>
-            <a:endParaRPr lang="fi-FI" sz="1200" dirty="0"/>
           </a:p>
         </p:txBody>
       </p:sp>
@@ -14184,34 +13730,25 @@
             <a:lstStyle/>
             <a:p>
               <a:r>
-                <a:rPr lang="fi-FI" sz="1200" dirty="0" smtClean="0"/>
-                <a:t>Muuttujan tyyppinä voidaan käyttää joko </a:t>
+                <a:rPr lang="fi-FI" sz="1200" dirty="0"/>
+                <a:t>Muuttujan tyyppinä voidaan käyttää joko rajapintaa </a:t>
               </a:r>
               <a:r>
-                <a:rPr lang="fi-FI" sz="1200" dirty="0" smtClean="0"/>
-                <a:t>rajapintaa </a:t>
-              </a:r>
-              <a:r>
-                <a:rPr lang="fi-FI" sz="1200" b="1" dirty="0" err="1" smtClean="0"/>
+                <a:rPr lang="fi-FI" sz="1200" b="1" dirty="0" err="1"/>
                 <a:t>Map</a:t>
               </a:r>
               <a:r>
-                <a:rPr lang="fi-FI" sz="1200" dirty="0" smtClean="0"/>
-                <a:t> tai </a:t>
+                <a:rPr lang="fi-FI" sz="1200" dirty="0"/>
+                <a:t> tai luokkaa </a:t>
               </a:r>
               <a:r>
-                <a:rPr lang="fi-FI" sz="1200" dirty="0" smtClean="0"/>
-                <a:t>luokkaa </a:t>
-              </a:r>
-              <a:r>
-                <a:rPr lang="fi-FI" sz="1200" b="1" dirty="0" err="1" smtClean="0"/>
+                <a:rPr lang="fi-FI" sz="1200" b="1" dirty="0" err="1"/>
                 <a:t>HashMap</a:t>
               </a:r>
               <a:r>
-                <a:rPr lang="fi-FI" sz="1200" dirty="0" smtClean="0"/>
+                <a:rPr lang="fi-FI" sz="1200" dirty="0"/>
                 <a:t>.</a:t>
               </a:r>
-              <a:endParaRPr lang="fi-FI" sz="1200" dirty="0"/>
             </a:p>
           </p:txBody>
         </p:sp>
@@ -14302,26 +13839,25 @@
             <a:lstStyle/>
             <a:p>
               <a:r>
-                <a:rPr lang="fi-FI" sz="1200" dirty="0" smtClean="0"/>
+                <a:rPr lang="fi-FI" sz="1200" dirty="0"/>
                 <a:t>Kulmasuluissa ensimmäinen tyyppi on </a:t>
               </a:r>
               <a:r>
-                <a:rPr lang="fi-FI" sz="1200" b="1" dirty="0" smtClean="0"/>
+                <a:rPr lang="fi-FI" sz="1200" b="1" dirty="0"/>
                 <a:t>avaimen tyyppi</a:t>
               </a:r>
               <a:r>
-                <a:rPr lang="fi-FI" sz="1200" dirty="0" smtClean="0"/>
+                <a:rPr lang="fi-FI" sz="1200" dirty="0"/>
                 <a:t>, toinen </a:t>
               </a:r>
               <a:r>
-                <a:rPr lang="fi-FI" sz="1200" b="1" dirty="0" smtClean="0"/>
+                <a:rPr lang="fi-FI" sz="1200" b="1" dirty="0"/>
                 <a:t>tallennettavien arvojen tyyppi</a:t>
               </a:r>
               <a:r>
-                <a:rPr lang="fi-FI" sz="1200" dirty="0" smtClean="0"/>
+                <a:rPr lang="fi-FI" sz="1200" dirty="0"/>
                 <a:t>.</a:t>
               </a:r>
-              <a:endParaRPr lang="fi-FI" sz="1200" dirty="0"/>
             </a:p>
           </p:txBody>
         </p:sp>
@@ -14550,11 +14086,11 @@
           <a:lstStyle/>
           <a:p>
             <a:r>
-              <a:rPr lang="fi-FI" dirty="0" smtClean="0"/>
+              <a:rPr lang="fi-FI" dirty="0"/>
               <a:t>Avainten ja arvojen hakeminen </a:t>
             </a:r>
             <a:r>
-              <a:rPr lang="fi-FI" dirty="0" err="1" smtClean="0">
+              <a:rPr lang="fi-FI" dirty="0" err="1">
                 <a:solidFill>
                   <a:schemeClr val="accent2"/>
                 </a:solidFill>
@@ -14563,7 +14099,7 @@
               <a:t>Map:</a:t>
             </a:r>
             <a:r>
-              <a:rPr lang="fi-FI" dirty="0" err="1" smtClean="0"/>
+              <a:rPr lang="fi-FI" dirty="0" err="1"/>
               <a:t>ista</a:t>
             </a:r>
             <a:endParaRPr lang="fi-FI" dirty="0"/>
@@ -15265,30 +14801,29 @@
             <a:lstStyle/>
             <a:p>
               <a:r>
-                <a:rPr lang="fi-FI" sz="1200" dirty="0" err="1" smtClean="0"/>
+                <a:rPr lang="fi-FI" sz="1200" dirty="0" err="1"/>
                 <a:t>Map:eihin</a:t>
               </a:r>
               <a:r>
-                <a:rPr lang="fi-FI" sz="1200" dirty="0" smtClean="0"/>
+                <a:rPr lang="fi-FI" sz="1200" dirty="0"/>
                 <a:t> voidaan tallentaa ainoastaan viittaustyyppisiä arvoja. Siksi </a:t>
               </a:r>
               <a:r>
-                <a:rPr lang="fi-FI" sz="1200" dirty="0" err="1" smtClean="0"/>
+                <a:rPr lang="fi-FI" sz="1200" dirty="0" err="1"/>
                 <a:t>int</a:t>
               </a:r>
               <a:r>
-                <a:rPr lang="fi-FI" sz="1200" dirty="0" smtClean="0"/>
+                <a:rPr lang="fi-FI" sz="1200" dirty="0"/>
                 <a:t>-tyypin sijaan käytetään </a:t>
               </a:r>
               <a:r>
-                <a:rPr lang="fi-FI" sz="1200" dirty="0" err="1" smtClean="0"/>
+                <a:rPr lang="fi-FI" sz="1200" dirty="0" err="1"/>
                 <a:t>Integer</a:t>
               </a:r>
               <a:r>
-                <a:rPr lang="fi-FI" sz="1200" dirty="0" smtClean="0"/>
+                <a:rPr lang="fi-FI" sz="1200" dirty="0"/>
                 <a:t>-tyyppiä.</a:t>
               </a:r>
-              <a:endParaRPr lang="fi-FI" sz="1200" dirty="0"/>
             </a:p>
           </p:txBody>
         </p:sp>
@@ -15464,10 +14999,9 @@
           <a:lstStyle/>
           <a:p>
             <a:r>
-              <a:rPr lang="fi-FI" dirty="0" smtClean="0"/>
+              <a:rPr lang="fi-FI" dirty="0"/>
               <a:t>Koodaustehtävä: lempinimet</a:t>
             </a:r>
-            <a:endParaRPr lang="fi-FI" dirty="0"/>
           </a:p>
         </p:txBody>
       </p:sp>
@@ -15530,34 +15064,17 @@
               <a:rPr lang="fi-FI" sz="1800" dirty="0"/>
               <a:t> ja lisätä siihen henkilöiden nimiä ja lempinimiä. </a:t>
             </a:r>
-            <a:endParaRPr lang="fi-FI" sz="1800" dirty="0" smtClean="0"/>
-          </a:p>
-          <a:p>
-            <a:r>
-              <a:rPr lang="fi-FI" sz="1800" dirty="0" smtClean="0"/>
-              <a:t>Henkilön </a:t>
-            </a:r>
+          </a:p>
+          <a:p>
             <a:r>
               <a:rPr lang="fi-FI" sz="1800" dirty="0"/>
-              <a:t>nimi toimii avaimena ja lempinimi arvona. Lisää nimet kokoelmaan </a:t>
-            </a:r>
-            <a:r>
-              <a:rPr lang="fi-FI" sz="1800" dirty="0" smtClean="0"/>
-              <a:t>oikealla esitetyssä järjestyksessä.</a:t>
-            </a:r>
-          </a:p>
-          <a:p>
-            <a:r>
-              <a:rPr lang="fi-FI" sz="1800" dirty="0" smtClean="0"/>
-              <a:t>Lopuksi </a:t>
-            </a:r>
+              <a:t>Henkilön nimi toimii avaimena ja lempinimi arvona. Lisää nimet kokoelmaan oikealla esitetyssä järjestyksessä.</a:t>
+            </a:r>
+          </a:p>
+          <a:p>
             <a:r>
               <a:rPr lang="fi-FI" sz="1800" dirty="0"/>
-              <a:t>tulosta kokoelma </a:t>
-            </a:r>
-            <a:r>
-              <a:rPr lang="fi-FI" sz="1800" dirty="0" smtClean="0"/>
-              <a:t>sellaisenaan.</a:t>
+              <a:t>Lopuksi tulosta kokoelma sellaisenaan.</a:t>
             </a:r>
           </a:p>
           <a:p>
@@ -15890,13 +15407,6 @@
   <p:clrMapOvr>
     <a:masterClrMapping/>
   </p:clrMapOvr>
-  <p:timing>
-    <p:tnLst>
-      <p:par>
-        <p:cTn id="1" dur="indefinite" restart="never" nodeType="tmRoot"/>
-      </p:par>
-    </p:tnLst>
-  </p:timing>
 </p:sld>
 </file>
 
@@ -15934,24 +15444,19 @@
           <a:p>
             <a:pPr algn="ctr"/>
             <a:r>
-              <a:rPr lang="fi-FI" dirty="0" smtClean="0"/>
+              <a:rPr lang="fi-FI" dirty="0"/>
               <a:t>Mitä jos lisäämme arvon olemassa olevalle avaimelle?</a:t>
             </a:r>
             <a:br>
-              <a:rPr lang="fi-FI" dirty="0" smtClean="0"/>
+              <a:rPr lang="fi-FI" dirty="0"/>
             </a:br>
-            <a:r>
-              <a:rPr lang="fi-FI" dirty="0" smtClean="0"/>
-              <a:t/>
-            </a:r>
             <a:br>
-              <a:rPr lang="fi-FI" dirty="0" smtClean="0"/>
+              <a:rPr lang="fi-FI" dirty="0"/>
             </a:br>
             <a:r>
-              <a:rPr lang="fi-FI" dirty="0" smtClean="0"/>
+              <a:rPr lang="fi-FI" dirty="0"/>
               <a:t>Mitä jos haemme arvoa avaimella, jota Mapista ei löydy?</a:t>
             </a:r>
-            <a:endParaRPr lang="fi-FI" dirty="0"/>
           </a:p>
         </p:txBody>
       </p:sp>
@@ -15984,13 +15489,6 @@
   <p:clrMapOvr>
     <a:masterClrMapping/>
   </p:clrMapOvr>
-  <p:timing>
-    <p:tnLst>
-      <p:par>
-        <p:cTn id="1" dur="indefinite" restart="never" nodeType="tmRoot"/>
-      </p:par>
-    </p:tnLst>
-  </p:timing>
 </p:sld>
 </file>
 
@@ -17123,18 +16621,18 @@
 </file>
 
 <file path=customXml/item1.xml><?xml version="1.0" encoding="utf-8"?>
-<p:properties xmlns:p="http://schemas.microsoft.com/office/2006/metadata/properties" xmlns:xsi="http://www.w3.org/2001/XMLSchema-instance" xmlns:pc="http://schemas.microsoft.com/office/infopath/2007/PartnerControls">
-  <documentManagement/>
-</p:properties>
-</file>
-
-<file path=customXml/item2.xml><?xml version="1.0" encoding="utf-8"?>
 <?mso-contentType ?>
 <FormTemplates xmlns="http://schemas.microsoft.com/sharepoint/v3/contenttype/forms">
   <Display>DocumentLibraryForm</Display>
   <Edit>DocumentLibraryForm</Edit>
   <New>DocumentLibraryForm</New>
 </FormTemplates>
+</file>
+
+<file path=customXml/item2.xml><?xml version="1.0" encoding="utf-8"?>
+<p:properties xmlns:p="http://schemas.microsoft.com/office/2006/metadata/properties" xmlns:xsi="http://www.w3.org/2001/XMLSchema-instance" xmlns:pc="http://schemas.microsoft.com/office/infopath/2007/PartnerControls">
+  <documentManagement/>
+</p:properties>
 </file>
 
 <file path=customXml/item3.xml><?xml version="1.0" encoding="utf-8"?>
@@ -17361,26 +16859,26 @@
 </file>
 
 <file path=customXml/itemProps1.xml><?xml version="1.0" encoding="utf-8"?>
-<ds:datastoreItem xmlns:ds="http://schemas.openxmlformats.org/officeDocument/2006/customXml" ds:itemID="{16FBA081-D94E-4BD2-8935-2BE3AF3EDCFB}">
+<ds:datastoreItem xmlns:ds="http://schemas.openxmlformats.org/officeDocument/2006/customXml" ds:itemID="{E8D3FC51-49FA-4143-BDA0-B421FFF35E4B}">
   <ds:schemaRefs>
-    <ds:schemaRef ds:uri="http://schemas.microsoft.com/office/2006/documentManagement/types"/>
-    <ds:schemaRef ds:uri="http://purl.org/dc/dcmitype/"/>
-    <ds:schemaRef ds:uri="http://schemas.microsoft.com/office/2006/metadata/properties"/>
-    <ds:schemaRef ds:uri="1abd3215-55aa-47dc-8f53-29cc2234956d"/>
-    <ds:schemaRef ds:uri="http://purl.org/dc/terms/"/>
-    <ds:schemaRef ds:uri="http://purl.org/dc/elements/1.1/"/>
-    <ds:schemaRef ds:uri="http://www.w3.org/XML/1998/namespace"/>
-    <ds:schemaRef ds:uri="http://schemas.microsoft.com/office/infopath/2007/PartnerControls"/>
-    <ds:schemaRef ds:uri="http://schemas.openxmlformats.org/package/2006/metadata/core-properties"/>
-    <ds:schemaRef ds:uri="bdc11839-7b04-44b9-89ff-04b67572c901"/>
+    <ds:schemaRef ds:uri="http://schemas.microsoft.com/sharepoint/v3/contenttype/forms"/>
   </ds:schemaRefs>
 </ds:datastoreItem>
 </file>
 
 <file path=customXml/itemProps2.xml><?xml version="1.0" encoding="utf-8"?>
-<ds:datastoreItem xmlns:ds="http://schemas.openxmlformats.org/officeDocument/2006/customXml" ds:itemID="{E8D3FC51-49FA-4143-BDA0-B421FFF35E4B}">
+<ds:datastoreItem xmlns:ds="http://schemas.openxmlformats.org/officeDocument/2006/customXml" ds:itemID="{16FBA081-D94E-4BD2-8935-2BE3AF3EDCFB}">
   <ds:schemaRefs>
-    <ds:schemaRef ds:uri="http://schemas.microsoft.com/sharepoint/v3/contenttype/forms"/>
+    <ds:schemaRef ds:uri="http://purl.org/dc/terms/"/>
+    <ds:schemaRef ds:uri="http://www.w3.org/XML/1998/namespace"/>
+    <ds:schemaRef ds:uri="http://schemas.microsoft.com/office/2006/documentManagement/types"/>
+    <ds:schemaRef ds:uri="http://purl.org/dc/elements/1.1/"/>
+    <ds:schemaRef ds:uri="http://purl.org/dc/dcmitype/"/>
+    <ds:schemaRef ds:uri="http://schemas.microsoft.com/office/2006/metadata/properties"/>
+    <ds:schemaRef ds:uri="1abd3215-55aa-47dc-8f53-29cc2234956d"/>
+    <ds:schemaRef ds:uri="http://schemas.microsoft.com/office/infopath/2007/PartnerControls"/>
+    <ds:schemaRef ds:uri="http://schemas.openxmlformats.org/package/2006/metadata/core-properties"/>
+    <ds:schemaRef ds:uri="bdc11839-7b04-44b9-89ff-04b67572c901"/>
   </ds:schemaRefs>
 </ds:datastoreItem>
 </file>

</xml_diff>